<commit_message>
added causes & impact on society slides
</commit_message>
<xml_diff>
--- a/BGS/FINAL PRESENTATION/CRIME IN DHAKA CITY.pptx
+++ b/BGS/FINAL PRESENTATION/CRIME IN DHAKA CITY.pptx
@@ -5,7 +5,7 @@
     <p:sldMasterId id="2147483801" r:id="rId1"/>
   </p:sldMasterIdLst>
   <p:notesMasterIdLst>
-    <p:notesMasterId r:id="rId10"/>
+    <p:notesMasterId r:id="rId19"/>
   </p:notesMasterIdLst>
   <p:sldIdLst>
     <p:sldId id="256" r:id="rId2"/>
@@ -16,6 +16,15 @@
     <p:sldId id="262" r:id="rId7"/>
     <p:sldId id="264" r:id="rId8"/>
     <p:sldId id="263" r:id="rId9"/>
+    <p:sldId id="265" r:id="rId10"/>
+    <p:sldId id="266" r:id="rId11"/>
+    <p:sldId id="267" r:id="rId12"/>
+    <p:sldId id="268" r:id="rId13"/>
+    <p:sldId id="269" r:id="rId14"/>
+    <p:sldId id="270" r:id="rId15"/>
+    <p:sldId id="271" r:id="rId16"/>
+    <p:sldId id="272" r:id="rId17"/>
+    <p:sldId id="273" r:id="rId18"/>
   </p:sldIdLst>
   <p:sldSz cx="12192000" cy="6858000"/>
   <p:notesSz cx="6858000" cy="9144000"/>
@@ -22043,7 +22052,7 @@
           <a:p>
             <a:fld id="{922FE5F8-4554-4F97-8572-1149E30E85FD}" type="datetimeFigureOut">
               <a:rPr lang="en-US" smtClean="0"/>
-              <a:t>8/10/2023</a:t>
+              <a:t>8/11/2023</a:t>
             </a:fld>
             <a:endParaRPr lang="en-US"/>
           </a:p>
@@ -22877,7 +22886,7 @@
           <a:p>
             <a:fld id="{82EDB8D0-98ED-4B86-9D5F-E61ADC70144D}" type="datetimeFigureOut">
               <a:rPr lang="en-US" smtClean="0"/>
-              <a:t>8/10/2023</a:t>
+              <a:t>8/11/2023</a:t>
             </a:fld>
             <a:endParaRPr lang="en-US" dirty="0"/>
           </a:p>
@@ -23075,7 +23084,7 @@
           <a:p>
             <a:fld id="{82EDB8D0-98ED-4B86-9D5F-E61ADC70144D}" type="datetimeFigureOut">
               <a:rPr lang="en-US" smtClean="0"/>
-              <a:t>8/10/2023</a:t>
+              <a:t>8/11/2023</a:t>
             </a:fld>
             <a:endParaRPr lang="en-US"/>
           </a:p>
@@ -23283,7 +23292,7 @@
           <a:p>
             <a:fld id="{82EDB8D0-98ED-4B86-9D5F-E61ADC70144D}" type="datetimeFigureOut">
               <a:rPr lang="en-US" smtClean="0"/>
-              <a:t>8/10/2023</a:t>
+              <a:t>8/11/2023</a:t>
             </a:fld>
             <a:endParaRPr lang="en-US"/>
           </a:p>
@@ -23481,7 +23490,7 @@
           <a:p>
             <a:fld id="{82EDB8D0-98ED-4B86-9D5F-E61ADC70144D}" type="datetimeFigureOut">
               <a:rPr lang="en-US" smtClean="0"/>
-              <a:t>8/10/2023</a:t>
+              <a:t>8/11/2023</a:t>
             </a:fld>
             <a:endParaRPr lang="en-US" dirty="0"/>
           </a:p>
@@ -23756,7 +23765,7 @@
           <a:p>
             <a:fld id="{82EDB8D0-98ED-4B86-9D5F-E61ADC70144D}" type="datetimeFigureOut">
               <a:rPr lang="en-US" smtClean="0"/>
-              <a:t>8/10/2023</a:t>
+              <a:t>8/11/2023</a:t>
             </a:fld>
             <a:endParaRPr lang="en-US"/>
           </a:p>
@@ -24021,7 +24030,7 @@
           <a:p>
             <a:fld id="{82EDB8D0-98ED-4B86-9D5F-E61ADC70144D}" type="datetimeFigureOut">
               <a:rPr lang="en-US" smtClean="0"/>
-              <a:t>8/10/2023</a:t>
+              <a:t>8/11/2023</a:t>
             </a:fld>
             <a:endParaRPr lang="en-US"/>
           </a:p>
@@ -24433,7 +24442,7 @@
           <a:p>
             <a:fld id="{82EDB8D0-98ED-4B86-9D5F-E61ADC70144D}" type="datetimeFigureOut">
               <a:rPr lang="en-US" smtClean="0"/>
-              <a:t>8/10/2023</a:t>
+              <a:t>8/11/2023</a:t>
             </a:fld>
             <a:endParaRPr lang="en-US"/>
           </a:p>
@@ -24574,7 +24583,7 @@
           <a:p>
             <a:fld id="{82EDB8D0-98ED-4B86-9D5F-E61ADC70144D}" type="datetimeFigureOut">
               <a:rPr lang="en-US" smtClean="0"/>
-              <a:t>8/10/2023</a:t>
+              <a:t>8/11/2023</a:t>
             </a:fld>
             <a:endParaRPr lang="en-US"/>
           </a:p>
@@ -24687,7 +24696,7 @@
           <a:p>
             <a:fld id="{82EDB8D0-98ED-4B86-9D5F-E61ADC70144D}" type="datetimeFigureOut">
               <a:rPr lang="en-US" smtClean="0"/>
-              <a:t>8/10/2023</a:t>
+              <a:t>8/11/2023</a:t>
             </a:fld>
             <a:endParaRPr lang="en-US"/>
           </a:p>
@@ -24998,7 +25007,7 @@
           <a:p>
             <a:fld id="{82EDB8D0-98ED-4B86-9D5F-E61ADC70144D}" type="datetimeFigureOut">
               <a:rPr lang="en-US" smtClean="0"/>
-              <a:t>8/10/2023</a:t>
+              <a:t>8/11/2023</a:t>
             </a:fld>
             <a:endParaRPr lang="en-US"/>
           </a:p>
@@ -25286,7 +25295,7 @@
           <a:p>
             <a:fld id="{82EDB8D0-98ED-4B86-9D5F-E61ADC70144D}" type="datetimeFigureOut">
               <a:rPr lang="en-US" smtClean="0"/>
-              <a:t>8/10/2023</a:t>
+              <a:t>8/11/2023</a:t>
             </a:fld>
             <a:endParaRPr lang="en-US"/>
           </a:p>
@@ -25528,7 +25537,7 @@
             <a:fld id="{82EDB8D0-98ED-4B86-9D5F-E61ADC70144D}" type="datetimeFigureOut">
               <a:rPr lang="en-US" smtClean="0"/>
               <a:pPr/>
-              <a:t>8/10/2023</a:t>
+              <a:t>8/11/2023</a:t>
             </a:fld>
             <a:endParaRPr lang="en-US" dirty="0"/>
           </a:p>
@@ -26196,6 +26205,1617 @@
   </p:cSld>
   <p:clrMapOvr>
     <a:overrideClrMapping bg1="dk1" tx1="lt1" bg2="dk2" tx2="lt2" accent1="accent1" accent2="accent2" accent3="accent3" accent4="accent4" accent5="accent5" accent6="accent6" hlink="hlink" folHlink="folHlink"/>
+  </p:clrMapOvr>
+</p:sld>
+</file>
+
+<file path=ppt/slides/slide10.xml><?xml version="1.0" encoding="utf-8"?>
+<p:sld xmlns:a="http://schemas.openxmlformats.org/drawingml/2006/main" xmlns:r="http://schemas.openxmlformats.org/officeDocument/2006/relationships" xmlns:p="http://schemas.openxmlformats.org/presentationml/2006/main">
+  <p:cSld>
+    <p:spTree>
+      <p:nvGrpSpPr>
+        <p:cNvPr id="1" name=""/>
+        <p:cNvGrpSpPr/>
+        <p:nvPr/>
+      </p:nvGrpSpPr>
+      <p:grpSpPr>
+        <a:xfrm>
+          <a:off x="0" y="0"/>
+          <a:ext cx="0" cy="0"/>
+          <a:chOff x="0" y="0"/>
+          <a:chExt cx="0" cy="0"/>
+        </a:xfrm>
+      </p:grpSpPr>
+      <p:sp>
+        <p:nvSpPr>
+          <p:cNvPr id="2" name="Title 1">
+            <a:extLst>
+              <a:ext uri="{FF2B5EF4-FFF2-40B4-BE49-F238E27FC236}">
+                <a16:creationId xmlns:a16="http://schemas.microsoft.com/office/drawing/2014/main" id="{F9E382D1-B4FF-C433-F3E5-0D8E8837DC7C}"/>
+              </a:ext>
+            </a:extLst>
+          </p:cNvPr>
+          <p:cNvSpPr>
+            <a:spLocks noGrp="1"/>
+          </p:cNvSpPr>
+          <p:nvPr>
+            <p:ph type="title"/>
+          </p:nvPr>
+        </p:nvSpPr>
+        <p:spPr>
+          <a:xfrm>
+            <a:off x="704850" y="-72232"/>
+            <a:ext cx="4743450" cy="1325563"/>
+          </a:xfrm>
+        </p:spPr>
+        <p:txBody>
+          <a:bodyPr/>
+          <a:lstStyle/>
+          <a:p>
+            <a:r>
+              <a:rPr lang="en-US" dirty="0">
+                <a:latin typeface="Arial Rounded MT Bold" panose="020F0704030504030204" pitchFamily="34" charset="0"/>
+              </a:rPr>
+              <a:t>CAUSES OF</a:t>
+            </a:r>
+          </a:p>
+        </p:txBody>
+      </p:sp>
+      <p:sp>
+        <p:nvSpPr>
+          <p:cNvPr id="3" name="Content Placeholder 2">
+            <a:extLst>
+              <a:ext uri="{FF2B5EF4-FFF2-40B4-BE49-F238E27FC236}">
+                <a16:creationId xmlns:a16="http://schemas.microsoft.com/office/drawing/2014/main" id="{F75A88C0-E201-8D64-161A-79C63A582631}"/>
+              </a:ext>
+            </a:extLst>
+          </p:cNvPr>
+          <p:cNvSpPr>
+            <a:spLocks noGrp="1"/>
+          </p:cNvSpPr>
+          <p:nvPr>
+            <p:ph idx="1"/>
+          </p:nvPr>
+        </p:nvSpPr>
+        <p:spPr/>
+        <p:txBody>
+          <a:bodyPr>
+            <a:normAutofit/>
+          </a:bodyPr>
+          <a:lstStyle/>
+          <a:p>
+            <a:pPr marL="0" indent="0" algn="l">
+              <a:buNone/>
+            </a:pPr>
+            <a:r>
+              <a:rPr lang="en-US" b="0" i="0" dirty="0">
+                <a:solidFill>
+                  <a:srgbClr val="232323"/>
+                </a:solidFill>
+                <a:effectLst/>
+                <a:latin typeface="Verdana" panose="020B0604030504040204" pitchFamily="34" charset="0"/>
+              </a:rPr>
+              <a:t>Drug addiction</a:t>
+            </a:r>
+          </a:p>
+          <a:p>
+            <a:pPr marL="0" indent="0" algn="just">
+              <a:buNone/>
+            </a:pPr>
+            <a:r>
+              <a:rPr lang="en-US" sz="2000" b="0" i="0" dirty="0">
+                <a:solidFill>
+                  <a:srgbClr val="232323"/>
+                </a:solidFill>
+                <a:effectLst/>
+                <a:latin typeface="Verdana" panose="020B0604030504040204" pitchFamily="34" charset="0"/>
+              </a:rPr>
+              <a:t>Day by day drug addiction is increasing, from elder to child. All are addicted to many different types of drugs. Almost all types of drugs are available in Bangladesh and mostly drugs supplier are selling drugs from the evening. About 43 percent of the country’s unemployed population is drug-addicted and in Bangladesh over 7.5 million people are drug-addicted. 80 percent of them are young people, 50 percent of whom are involved in multiple criminal activities. 48% of drug users are educated and 40 percent are uneducated out of the number. This drug addiction is one of the main reason to commit criminal offenses in Dhaka city</a:t>
+            </a:r>
+          </a:p>
+          <a:p>
+            <a:pPr marL="0" indent="0">
+              <a:buNone/>
+            </a:pPr>
+            <a:endParaRPr lang="en-US" sz="2000" dirty="0"/>
+          </a:p>
+        </p:txBody>
+      </p:sp>
+      <p:sp>
+        <p:nvSpPr>
+          <p:cNvPr id="6" name="Rectangle 5">
+            <a:extLst>
+              <a:ext uri="{FF2B5EF4-FFF2-40B4-BE49-F238E27FC236}">
+                <a16:creationId xmlns:a16="http://schemas.microsoft.com/office/drawing/2014/main" id="{1AF20BA7-48BA-7033-425F-9C7AE1D56D16}"/>
+              </a:ext>
+            </a:extLst>
+          </p:cNvPr>
+          <p:cNvSpPr/>
+          <p:nvPr/>
+        </p:nvSpPr>
+        <p:spPr>
+          <a:xfrm>
+            <a:off x="904875" y="929878"/>
+            <a:ext cx="2019300" cy="609600"/>
+          </a:xfrm>
+          <a:prstGeom prst="rect">
+            <a:avLst/>
+          </a:prstGeom>
+          <a:solidFill>
+            <a:srgbClr val="C00000"/>
+          </a:solidFill>
+        </p:spPr>
+        <p:style>
+          <a:lnRef idx="2">
+            <a:schemeClr val="accent1">
+              <a:shade val="15000"/>
+            </a:schemeClr>
+          </a:lnRef>
+          <a:fillRef idx="1">
+            <a:schemeClr val="accent1"/>
+          </a:fillRef>
+          <a:effectRef idx="0">
+            <a:schemeClr val="accent1"/>
+          </a:effectRef>
+          <a:fontRef idx="minor">
+            <a:schemeClr val="lt1"/>
+          </a:fontRef>
+        </p:style>
+        <p:txBody>
+          <a:bodyPr rtlCol="0" anchor="ctr"/>
+          <a:lstStyle/>
+          <a:p>
+            <a:pPr algn="ctr"/>
+            <a:r>
+              <a:rPr lang="en-US" sz="4400" dirty="0">
+                <a:solidFill>
+                  <a:schemeClr val="tx1"/>
+                </a:solidFill>
+                <a:latin typeface="Arial Rounded MT Bold" panose="020F0704030504030204" pitchFamily="34" charset="0"/>
+              </a:rPr>
+              <a:t>CRIME</a:t>
+            </a:r>
+            <a:endParaRPr lang="en-US" sz="4400" dirty="0">
+              <a:solidFill>
+                <a:schemeClr val="tx1"/>
+              </a:solidFill>
+            </a:endParaRPr>
+          </a:p>
+        </p:txBody>
+      </p:sp>
+    </p:spTree>
+    <p:extLst>
+      <p:ext uri="{BB962C8B-B14F-4D97-AF65-F5344CB8AC3E}">
+        <p14:creationId xmlns:p14="http://schemas.microsoft.com/office/powerpoint/2010/main" val="3916276639"/>
+      </p:ext>
+    </p:extLst>
+  </p:cSld>
+  <p:clrMapOvr>
+    <a:masterClrMapping/>
+  </p:clrMapOvr>
+</p:sld>
+</file>
+
+<file path=ppt/slides/slide11.xml><?xml version="1.0" encoding="utf-8"?>
+<p:sld xmlns:a="http://schemas.openxmlformats.org/drawingml/2006/main" xmlns:r="http://schemas.openxmlformats.org/officeDocument/2006/relationships" xmlns:p="http://schemas.openxmlformats.org/presentationml/2006/main">
+  <p:cSld>
+    <p:spTree>
+      <p:nvGrpSpPr>
+        <p:cNvPr id="1" name=""/>
+        <p:cNvGrpSpPr/>
+        <p:nvPr/>
+      </p:nvGrpSpPr>
+      <p:grpSpPr>
+        <a:xfrm>
+          <a:off x="0" y="0"/>
+          <a:ext cx="0" cy="0"/>
+          <a:chOff x="0" y="0"/>
+          <a:chExt cx="0" cy="0"/>
+        </a:xfrm>
+      </p:grpSpPr>
+      <p:sp>
+        <p:nvSpPr>
+          <p:cNvPr id="2" name="Title 1">
+            <a:extLst>
+              <a:ext uri="{FF2B5EF4-FFF2-40B4-BE49-F238E27FC236}">
+                <a16:creationId xmlns:a16="http://schemas.microsoft.com/office/drawing/2014/main" id="{F9E382D1-B4FF-C433-F3E5-0D8E8837DC7C}"/>
+              </a:ext>
+            </a:extLst>
+          </p:cNvPr>
+          <p:cNvSpPr>
+            <a:spLocks noGrp="1"/>
+          </p:cNvSpPr>
+          <p:nvPr>
+            <p:ph type="title"/>
+          </p:nvPr>
+        </p:nvSpPr>
+        <p:spPr>
+          <a:xfrm>
+            <a:off x="704850" y="-72232"/>
+            <a:ext cx="4743450" cy="1325563"/>
+          </a:xfrm>
+        </p:spPr>
+        <p:txBody>
+          <a:bodyPr/>
+          <a:lstStyle/>
+          <a:p>
+            <a:r>
+              <a:rPr lang="en-US" dirty="0">
+                <a:latin typeface="Arial Rounded MT Bold" panose="020F0704030504030204" pitchFamily="34" charset="0"/>
+              </a:rPr>
+              <a:t>CAUSES OF</a:t>
+            </a:r>
+          </a:p>
+        </p:txBody>
+      </p:sp>
+      <p:sp>
+        <p:nvSpPr>
+          <p:cNvPr id="3" name="Content Placeholder 2">
+            <a:extLst>
+              <a:ext uri="{FF2B5EF4-FFF2-40B4-BE49-F238E27FC236}">
+                <a16:creationId xmlns:a16="http://schemas.microsoft.com/office/drawing/2014/main" id="{F75A88C0-E201-8D64-161A-79C63A582631}"/>
+              </a:ext>
+            </a:extLst>
+          </p:cNvPr>
+          <p:cNvSpPr>
+            <a:spLocks noGrp="1"/>
+          </p:cNvSpPr>
+          <p:nvPr>
+            <p:ph idx="1"/>
+          </p:nvPr>
+        </p:nvSpPr>
+        <p:spPr/>
+        <p:txBody>
+          <a:bodyPr>
+            <a:normAutofit/>
+          </a:bodyPr>
+          <a:lstStyle/>
+          <a:p>
+            <a:pPr marL="0" indent="0" algn="l">
+              <a:buNone/>
+            </a:pPr>
+            <a:r>
+              <a:rPr lang="en-US" b="1" i="0" dirty="0">
+                <a:solidFill>
+                  <a:srgbClr val="232323"/>
+                </a:solidFill>
+                <a:effectLst/>
+                <a:latin typeface="Verdana" panose="020B0604030504040204" pitchFamily="34" charset="0"/>
+              </a:rPr>
+              <a:t>Depression and mental Disorder</a:t>
+            </a:r>
+          </a:p>
+          <a:p>
+            <a:pPr marL="0" indent="0" algn="just">
+              <a:buNone/>
+            </a:pPr>
+            <a:r>
+              <a:rPr lang="en-US" sz="2000" b="0" i="0" dirty="0">
+                <a:solidFill>
+                  <a:srgbClr val="232323"/>
+                </a:solidFill>
+                <a:effectLst/>
+                <a:latin typeface="Verdana" panose="020B0604030504040204" pitchFamily="34" charset="0"/>
+              </a:rPr>
+              <a:t>Depression and mental disorders can contribute to criminal behavior due to factors such as impaired decision-making, substance abuse as a coping mechanism, poverty and homelessness leading to desperation, self-medication attempts, lack of social support fostering anger and isolation, reduced ability to comprehend consequences, and the interaction of co-occurring disorders. However, it's important to note that while these factors might increase the risk, the majority of individuals with mental disorders do not engage in criminal activities, and with proper support and treatment, the likelihood of such behavior can be significantly reduced</a:t>
+            </a:r>
+            <a:endParaRPr lang="en-US" b="0" i="0" dirty="0">
+              <a:solidFill>
+                <a:srgbClr val="232323"/>
+              </a:solidFill>
+              <a:effectLst/>
+              <a:latin typeface="Verdana" panose="020B0604030504040204" pitchFamily="34" charset="0"/>
+            </a:endParaRPr>
+          </a:p>
+        </p:txBody>
+      </p:sp>
+      <p:sp>
+        <p:nvSpPr>
+          <p:cNvPr id="6" name="Rectangle 5">
+            <a:extLst>
+              <a:ext uri="{FF2B5EF4-FFF2-40B4-BE49-F238E27FC236}">
+                <a16:creationId xmlns:a16="http://schemas.microsoft.com/office/drawing/2014/main" id="{1AF20BA7-48BA-7033-425F-9C7AE1D56D16}"/>
+              </a:ext>
+            </a:extLst>
+          </p:cNvPr>
+          <p:cNvSpPr/>
+          <p:nvPr/>
+        </p:nvSpPr>
+        <p:spPr>
+          <a:xfrm>
+            <a:off x="904875" y="929878"/>
+            <a:ext cx="2019300" cy="609600"/>
+          </a:xfrm>
+          <a:prstGeom prst="rect">
+            <a:avLst/>
+          </a:prstGeom>
+          <a:solidFill>
+            <a:srgbClr val="C00000"/>
+          </a:solidFill>
+        </p:spPr>
+        <p:style>
+          <a:lnRef idx="2">
+            <a:schemeClr val="accent1">
+              <a:shade val="15000"/>
+            </a:schemeClr>
+          </a:lnRef>
+          <a:fillRef idx="1">
+            <a:schemeClr val="accent1"/>
+          </a:fillRef>
+          <a:effectRef idx="0">
+            <a:schemeClr val="accent1"/>
+          </a:effectRef>
+          <a:fontRef idx="minor">
+            <a:schemeClr val="lt1"/>
+          </a:fontRef>
+        </p:style>
+        <p:txBody>
+          <a:bodyPr rtlCol="0" anchor="ctr"/>
+          <a:lstStyle/>
+          <a:p>
+            <a:pPr algn="ctr"/>
+            <a:r>
+              <a:rPr lang="en-US" sz="4400" dirty="0">
+                <a:solidFill>
+                  <a:schemeClr val="tx1"/>
+                </a:solidFill>
+                <a:latin typeface="Arial Rounded MT Bold" panose="020F0704030504030204" pitchFamily="34" charset="0"/>
+              </a:rPr>
+              <a:t>CRIME</a:t>
+            </a:r>
+            <a:endParaRPr lang="en-US" sz="4400" dirty="0">
+              <a:solidFill>
+                <a:schemeClr val="tx1"/>
+              </a:solidFill>
+            </a:endParaRPr>
+          </a:p>
+        </p:txBody>
+      </p:sp>
+    </p:spTree>
+    <p:extLst>
+      <p:ext uri="{BB962C8B-B14F-4D97-AF65-F5344CB8AC3E}">
+        <p14:creationId xmlns:p14="http://schemas.microsoft.com/office/powerpoint/2010/main" val="1140916156"/>
+      </p:ext>
+    </p:extLst>
+  </p:cSld>
+  <p:clrMapOvr>
+    <a:masterClrMapping/>
+  </p:clrMapOvr>
+</p:sld>
+</file>
+
+<file path=ppt/slides/slide12.xml><?xml version="1.0" encoding="utf-8"?>
+<p:sld xmlns:a="http://schemas.openxmlformats.org/drawingml/2006/main" xmlns:r="http://schemas.openxmlformats.org/officeDocument/2006/relationships" xmlns:p="http://schemas.openxmlformats.org/presentationml/2006/main">
+  <p:cSld>
+    <p:spTree>
+      <p:nvGrpSpPr>
+        <p:cNvPr id="1" name=""/>
+        <p:cNvGrpSpPr/>
+        <p:nvPr/>
+      </p:nvGrpSpPr>
+      <p:grpSpPr>
+        <a:xfrm>
+          <a:off x="0" y="0"/>
+          <a:ext cx="0" cy="0"/>
+          <a:chOff x="0" y="0"/>
+          <a:chExt cx="0" cy="0"/>
+        </a:xfrm>
+      </p:grpSpPr>
+      <p:sp>
+        <p:nvSpPr>
+          <p:cNvPr id="2" name="Title 1">
+            <a:extLst>
+              <a:ext uri="{FF2B5EF4-FFF2-40B4-BE49-F238E27FC236}">
+                <a16:creationId xmlns:a16="http://schemas.microsoft.com/office/drawing/2014/main" id="{F9E382D1-B4FF-C433-F3E5-0D8E8837DC7C}"/>
+              </a:ext>
+            </a:extLst>
+          </p:cNvPr>
+          <p:cNvSpPr>
+            <a:spLocks noGrp="1"/>
+          </p:cNvSpPr>
+          <p:nvPr>
+            <p:ph type="title"/>
+          </p:nvPr>
+        </p:nvSpPr>
+        <p:spPr>
+          <a:xfrm>
+            <a:off x="704850" y="-72232"/>
+            <a:ext cx="4743450" cy="1325563"/>
+          </a:xfrm>
+        </p:spPr>
+        <p:txBody>
+          <a:bodyPr/>
+          <a:lstStyle/>
+          <a:p>
+            <a:r>
+              <a:rPr lang="en-US" dirty="0">
+                <a:latin typeface="Arial Rounded MT Bold" panose="020F0704030504030204" pitchFamily="34" charset="0"/>
+              </a:rPr>
+              <a:t>CAUSES OF</a:t>
+            </a:r>
+          </a:p>
+        </p:txBody>
+      </p:sp>
+      <p:sp>
+        <p:nvSpPr>
+          <p:cNvPr id="3" name="Content Placeholder 2">
+            <a:extLst>
+              <a:ext uri="{FF2B5EF4-FFF2-40B4-BE49-F238E27FC236}">
+                <a16:creationId xmlns:a16="http://schemas.microsoft.com/office/drawing/2014/main" id="{F75A88C0-E201-8D64-161A-79C63A582631}"/>
+              </a:ext>
+            </a:extLst>
+          </p:cNvPr>
+          <p:cNvSpPr>
+            <a:spLocks noGrp="1"/>
+          </p:cNvSpPr>
+          <p:nvPr>
+            <p:ph idx="1"/>
+          </p:nvPr>
+        </p:nvSpPr>
+        <p:spPr>
+          <a:xfrm>
+            <a:off x="838200" y="1825625"/>
+            <a:ext cx="10515600" cy="2384425"/>
+          </a:xfrm>
+        </p:spPr>
+        <p:txBody>
+          <a:bodyPr>
+            <a:normAutofit/>
+          </a:bodyPr>
+          <a:lstStyle/>
+          <a:p>
+            <a:pPr marL="0" indent="0" algn="l">
+              <a:buNone/>
+            </a:pPr>
+            <a:r>
+              <a:rPr lang="en-US" b="1" i="0" dirty="0">
+                <a:solidFill>
+                  <a:srgbClr val="232323"/>
+                </a:solidFill>
+                <a:effectLst/>
+                <a:latin typeface="Verdana" panose="020B0604030504040204" pitchFamily="34" charset="0"/>
+              </a:rPr>
+              <a:t>Abuse of political power</a:t>
+            </a:r>
+          </a:p>
+          <a:p>
+            <a:pPr marL="0" indent="0" algn="just">
+              <a:buNone/>
+            </a:pPr>
+            <a:r>
+              <a:rPr lang="en-US" sz="2000" b="0" i="0" dirty="0">
+                <a:solidFill>
+                  <a:srgbClr val="232323"/>
+                </a:solidFill>
+                <a:effectLst/>
+                <a:latin typeface="Verdana" panose="020B0604030504040204" pitchFamily="34" charset="0"/>
+              </a:rPr>
+              <a:t>Recently a common thing is the abuse of political power. Some people are very strongly involved with this. The government is sending relief for homeless and poor people, but they are not getting this relief. As soon as government relief arrives, they are sharing among themselves. Crime is being created today for all these influential people. Influential people are creating terror. Influential people are taking advantage of the weakness of the poor and uneducated people</a:t>
+            </a:r>
+          </a:p>
+          <a:p>
+            <a:pPr marL="0" indent="0" algn="l">
+              <a:buNone/>
+            </a:pPr>
+            <a:endParaRPr lang="en-US" sz="2000" b="0" i="0" dirty="0">
+              <a:solidFill>
+                <a:srgbClr val="232323"/>
+              </a:solidFill>
+              <a:effectLst/>
+              <a:latin typeface="Verdana" panose="020B0604030504040204" pitchFamily="34" charset="0"/>
+            </a:endParaRPr>
+          </a:p>
+        </p:txBody>
+      </p:sp>
+      <p:sp>
+        <p:nvSpPr>
+          <p:cNvPr id="6" name="Rectangle 5">
+            <a:extLst>
+              <a:ext uri="{FF2B5EF4-FFF2-40B4-BE49-F238E27FC236}">
+                <a16:creationId xmlns:a16="http://schemas.microsoft.com/office/drawing/2014/main" id="{1AF20BA7-48BA-7033-425F-9C7AE1D56D16}"/>
+              </a:ext>
+            </a:extLst>
+          </p:cNvPr>
+          <p:cNvSpPr/>
+          <p:nvPr/>
+        </p:nvSpPr>
+        <p:spPr>
+          <a:xfrm>
+            <a:off x="904875" y="929878"/>
+            <a:ext cx="2019300" cy="609600"/>
+          </a:xfrm>
+          <a:prstGeom prst="rect">
+            <a:avLst/>
+          </a:prstGeom>
+          <a:solidFill>
+            <a:srgbClr val="C00000"/>
+          </a:solidFill>
+        </p:spPr>
+        <p:style>
+          <a:lnRef idx="2">
+            <a:schemeClr val="accent1">
+              <a:shade val="15000"/>
+            </a:schemeClr>
+          </a:lnRef>
+          <a:fillRef idx="1">
+            <a:schemeClr val="accent1"/>
+          </a:fillRef>
+          <a:effectRef idx="0">
+            <a:schemeClr val="accent1"/>
+          </a:effectRef>
+          <a:fontRef idx="minor">
+            <a:schemeClr val="lt1"/>
+          </a:fontRef>
+        </p:style>
+        <p:txBody>
+          <a:bodyPr rtlCol="0" anchor="ctr"/>
+          <a:lstStyle/>
+          <a:p>
+            <a:pPr algn="ctr"/>
+            <a:r>
+              <a:rPr lang="en-US" sz="4400" dirty="0">
+                <a:solidFill>
+                  <a:schemeClr val="tx1"/>
+                </a:solidFill>
+                <a:latin typeface="Arial Rounded MT Bold" panose="020F0704030504030204" pitchFamily="34" charset="0"/>
+              </a:rPr>
+              <a:t>CRIME</a:t>
+            </a:r>
+            <a:endParaRPr lang="en-US" sz="4400" dirty="0">
+              <a:solidFill>
+                <a:schemeClr val="tx1"/>
+              </a:solidFill>
+            </a:endParaRPr>
+          </a:p>
+        </p:txBody>
+      </p:sp>
+      <p:sp>
+        <p:nvSpPr>
+          <p:cNvPr id="4" name="TextBox 3">
+            <a:extLst>
+              <a:ext uri="{FF2B5EF4-FFF2-40B4-BE49-F238E27FC236}">
+                <a16:creationId xmlns:a16="http://schemas.microsoft.com/office/drawing/2014/main" id="{379B582D-078A-3313-294D-6E2171FA2F90}"/>
+              </a:ext>
+            </a:extLst>
+          </p:cNvPr>
+          <p:cNvSpPr txBox="1"/>
+          <p:nvPr/>
+        </p:nvSpPr>
+        <p:spPr>
+          <a:xfrm>
+            <a:off x="838200" y="4048125"/>
+            <a:ext cx="10515600" cy="2954655"/>
+          </a:xfrm>
+          <a:prstGeom prst="rect">
+            <a:avLst/>
+          </a:prstGeom>
+          <a:noFill/>
+        </p:spPr>
+        <p:txBody>
+          <a:bodyPr wrap="square" rtlCol="0">
+            <a:spAutoFit/>
+          </a:bodyPr>
+          <a:lstStyle/>
+          <a:p>
+            <a:pPr algn="l"/>
+            <a:r>
+              <a:rPr lang="en-US" sz="2800" b="1" i="0" dirty="0">
+                <a:solidFill>
+                  <a:srgbClr val="232323"/>
+                </a:solidFill>
+                <a:effectLst/>
+                <a:latin typeface="Verdana" panose="020B0604030504040204" pitchFamily="34" charset="0"/>
+              </a:rPr>
+              <a:t>State of the family</a:t>
+            </a:r>
+          </a:p>
+          <a:p>
+            <a:pPr algn="just"/>
+            <a:r>
+              <a:rPr lang="en-US" sz="2000" b="0" i="0" dirty="0">
+                <a:solidFill>
+                  <a:srgbClr val="232323"/>
+                </a:solidFill>
+                <a:effectLst/>
+                <a:latin typeface="Verdana" panose="020B0604030504040204" pitchFamily="34" charset="0"/>
+              </a:rPr>
+              <a:t>Most crimes start from the family and later spread to the society. The initiation of all types of crime is family unrest and property. Since most families in the village are poor and illiterate, that’s why there is no opportunity to consider what is right and what is wrong. An uneducated family cannot teach a proper lesson to their family child. In that cause, girls are getting married at an early age, children are involved in crime and children are taking drugs, being terrorists, carrying weapons, and beginning an illegal business</a:t>
+            </a:r>
+          </a:p>
+          <a:p>
+            <a:endParaRPr lang="en-US" dirty="0"/>
+          </a:p>
+        </p:txBody>
+      </p:sp>
+    </p:spTree>
+    <p:extLst>
+      <p:ext uri="{BB962C8B-B14F-4D97-AF65-F5344CB8AC3E}">
+        <p14:creationId xmlns:p14="http://schemas.microsoft.com/office/powerpoint/2010/main" val="2717400911"/>
+      </p:ext>
+    </p:extLst>
+  </p:cSld>
+  <p:clrMapOvr>
+    <a:masterClrMapping/>
+  </p:clrMapOvr>
+</p:sld>
+</file>
+
+<file path=ppt/slides/slide13.xml><?xml version="1.0" encoding="utf-8"?>
+<p:sld xmlns:a="http://schemas.openxmlformats.org/drawingml/2006/main" xmlns:r="http://schemas.openxmlformats.org/officeDocument/2006/relationships" xmlns:p="http://schemas.openxmlformats.org/presentationml/2006/main">
+  <p:cSld>
+    <p:spTree>
+      <p:nvGrpSpPr>
+        <p:cNvPr id="1" name=""/>
+        <p:cNvGrpSpPr/>
+        <p:nvPr/>
+      </p:nvGrpSpPr>
+      <p:grpSpPr>
+        <a:xfrm>
+          <a:off x="0" y="0"/>
+          <a:ext cx="0" cy="0"/>
+          <a:chOff x="0" y="0"/>
+          <a:chExt cx="0" cy="0"/>
+        </a:xfrm>
+      </p:grpSpPr>
+      <p:sp>
+        <p:nvSpPr>
+          <p:cNvPr id="2" name="Title 1">
+            <a:extLst>
+              <a:ext uri="{FF2B5EF4-FFF2-40B4-BE49-F238E27FC236}">
+                <a16:creationId xmlns:a16="http://schemas.microsoft.com/office/drawing/2014/main" id="{F9E382D1-B4FF-C433-F3E5-0D8E8837DC7C}"/>
+              </a:ext>
+            </a:extLst>
+          </p:cNvPr>
+          <p:cNvSpPr>
+            <a:spLocks noGrp="1"/>
+          </p:cNvSpPr>
+          <p:nvPr>
+            <p:ph type="title"/>
+          </p:nvPr>
+        </p:nvSpPr>
+        <p:spPr>
+          <a:xfrm>
+            <a:off x="704850" y="-72232"/>
+            <a:ext cx="4743450" cy="1325563"/>
+          </a:xfrm>
+        </p:spPr>
+        <p:txBody>
+          <a:bodyPr/>
+          <a:lstStyle/>
+          <a:p>
+            <a:r>
+              <a:rPr lang="en-US" dirty="0">
+                <a:latin typeface="Arial Rounded MT Bold" panose="020F0704030504030204" pitchFamily="34" charset="0"/>
+              </a:rPr>
+              <a:t>CAUSES OF</a:t>
+            </a:r>
+          </a:p>
+        </p:txBody>
+      </p:sp>
+      <p:sp>
+        <p:nvSpPr>
+          <p:cNvPr id="3" name="Content Placeholder 2">
+            <a:extLst>
+              <a:ext uri="{FF2B5EF4-FFF2-40B4-BE49-F238E27FC236}">
+                <a16:creationId xmlns:a16="http://schemas.microsoft.com/office/drawing/2014/main" id="{F75A88C0-E201-8D64-161A-79C63A582631}"/>
+              </a:ext>
+            </a:extLst>
+          </p:cNvPr>
+          <p:cNvSpPr>
+            <a:spLocks noGrp="1"/>
+          </p:cNvSpPr>
+          <p:nvPr>
+            <p:ph idx="1"/>
+          </p:nvPr>
+        </p:nvSpPr>
+        <p:spPr>
+          <a:xfrm>
+            <a:off x="838200" y="1825625"/>
+            <a:ext cx="10515600" cy="2384425"/>
+          </a:xfrm>
+        </p:spPr>
+        <p:txBody>
+          <a:bodyPr>
+            <a:normAutofit/>
+          </a:bodyPr>
+          <a:lstStyle/>
+          <a:p>
+            <a:pPr marL="0" indent="0" algn="l">
+              <a:buNone/>
+            </a:pPr>
+            <a:r>
+              <a:rPr lang="en-US" b="1" i="0" dirty="0">
+                <a:solidFill>
+                  <a:srgbClr val="232323"/>
+                </a:solidFill>
+                <a:effectLst/>
+                <a:latin typeface="Verdana" panose="020B0604030504040204" pitchFamily="34" charset="0"/>
+              </a:rPr>
+              <a:t>Abuse of political power</a:t>
+            </a:r>
+          </a:p>
+          <a:p>
+            <a:pPr marL="0" indent="0" algn="just">
+              <a:buNone/>
+            </a:pPr>
+            <a:r>
+              <a:rPr lang="en-US" sz="2000" b="0" i="0" dirty="0">
+                <a:solidFill>
+                  <a:srgbClr val="232323"/>
+                </a:solidFill>
+                <a:effectLst/>
+                <a:latin typeface="Verdana" panose="020B0604030504040204" pitchFamily="34" charset="0"/>
+              </a:rPr>
+              <a:t>Recently a common thing is the abuse of political power. Some people are very strongly involved with this. The government is sending relief for homeless and poor people, but they are not getting this relief. As soon as government relief arrives, they are sharing among themselves. Crime is being created today for all these influential people. Influential people are creating terror. Influential people are taking advantage of the weakness of the poor and uneducated people</a:t>
+            </a:r>
+          </a:p>
+          <a:p>
+            <a:pPr marL="0" indent="0" algn="l">
+              <a:buNone/>
+            </a:pPr>
+            <a:endParaRPr lang="en-US" sz="2000" b="0" i="0" dirty="0">
+              <a:solidFill>
+                <a:srgbClr val="232323"/>
+              </a:solidFill>
+              <a:effectLst/>
+              <a:latin typeface="Verdana" panose="020B0604030504040204" pitchFamily="34" charset="0"/>
+            </a:endParaRPr>
+          </a:p>
+        </p:txBody>
+      </p:sp>
+      <p:sp>
+        <p:nvSpPr>
+          <p:cNvPr id="6" name="Rectangle 5">
+            <a:extLst>
+              <a:ext uri="{FF2B5EF4-FFF2-40B4-BE49-F238E27FC236}">
+                <a16:creationId xmlns:a16="http://schemas.microsoft.com/office/drawing/2014/main" id="{1AF20BA7-48BA-7033-425F-9C7AE1D56D16}"/>
+              </a:ext>
+            </a:extLst>
+          </p:cNvPr>
+          <p:cNvSpPr/>
+          <p:nvPr/>
+        </p:nvSpPr>
+        <p:spPr>
+          <a:xfrm>
+            <a:off x="904875" y="929878"/>
+            <a:ext cx="2019300" cy="609600"/>
+          </a:xfrm>
+          <a:prstGeom prst="rect">
+            <a:avLst/>
+          </a:prstGeom>
+          <a:solidFill>
+            <a:srgbClr val="C00000"/>
+          </a:solidFill>
+        </p:spPr>
+        <p:style>
+          <a:lnRef idx="2">
+            <a:schemeClr val="accent1">
+              <a:shade val="15000"/>
+            </a:schemeClr>
+          </a:lnRef>
+          <a:fillRef idx="1">
+            <a:schemeClr val="accent1"/>
+          </a:fillRef>
+          <a:effectRef idx="0">
+            <a:schemeClr val="accent1"/>
+          </a:effectRef>
+          <a:fontRef idx="minor">
+            <a:schemeClr val="lt1"/>
+          </a:fontRef>
+        </p:style>
+        <p:txBody>
+          <a:bodyPr rtlCol="0" anchor="ctr"/>
+          <a:lstStyle/>
+          <a:p>
+            <a:pPr algn="ctr"/>
+            <a:r>
+              <a:rPr lang="en-US" sz="4400" dirty="0">
+                <a:solidFill>
+                  <a:schemeClr val="tx1"/>
+                </a:solidFill>
+                <a:latin typeface="Arial Rounded MT Bold" panose="020F0704030504030204" pitchFamily="34" charset="0"/>
+              </a:rPr>
+              <a:t>CRIME</a:t>
+            </a:r>
+            <a:endParaRPr lang="en-US" sz="4400" dirty="0">
+              <a:solidFill>
+                <a:schemeClr val="tx1"/>
+              </a:solidFill>
+            </a:endParaRPr>
+          </a:p>
+        </p:txBody>
+      </p:sp>
+      <p:sp>
+        <p:nvSpPr>
+          <p:cNvPr id="4" name="TextBox 3">
+            <a:extLst>
+              <a:ext uri="{FF2B5EF4-FFF2-40B4-BE49-F238E27FC236}">
+                <a16:creationId xmlns:a16="http://schemas.microsoft.com/office/drawing/2014/main" id="{379B582D-078A-3313-294D-6E2171FA2F90}"/>
+              </a:ext>
+            </a:extLst>
+          </p:cNvPr>
+          <p:cNvSpPr txBox="1"/>
+          <p:nvPr/>
+        </p:nvSpPr>
+        <p:spPr>
+          <a:xfrm>
+            <a:off x="838200" y="4048125"/>
+            <a:ext cx="10515600" cy="2954655"/>
+          </a:xfrm>
+          <a:prstGeom prst="rect">
+            <a:avLst/>
+          </a:prstGeom>
+          <a:noFill/>
+        </p:spPr>
+        <p:txBody>
+          <a:bodyPr wrap="square" rtlCol="0">
+            <a:spAutoFit/>
+          </a:bodyPr>
+          <a:lstStyle/>
+          <a:p>
+            <a:pPr algn="l"/>
+            <a:r>
+              <a:rPr lang="en-US" sz="2800" b="1" i="0" dirty="0">
+                <a:solidFill>
+                  <a:srgbClr val="232323"/>
+                </a:solidFill>
+                <a:effectLst/>
+                <a:latin typeface="Verdana" panose="020B0604030504040204" pitchFamily="34" charset="0"/>
+              </a:rPr>
+              <a:t>State of the family</a:t>
+            </a:r>
+          </a:p>
+          <a:p>
+            <a:pPr algn="just"/>
+            <a:r>
+              <a:rPr lang="en-US" sz="2000" b="0" i="0" dirty="0">
+                <a:solidFill>
+                  <a:srgbClr val="232323"/>
+                </a:solidFill>
+                <a:effectLst/>
+                <a:latin typeface="Verdana" panose="020B0604030504040204" pitchFamily="34" charset="0"/>
+              </a:rPr>
+              <a:t>Most crimes start from the family and later spread to the society. The initiation of all types of crime is family unrest and property. Since most families in the village are poor and illiterate, that’s why there is no opportunity to consider what is right and what is wrong. An uneducated family cannot teach a proper lesson to their family child. In that cause, girls are getting married at an early age, children are involved in crime and children are taking drugs, being terrorists, carrying weapons, and beginning an illegal business</a:t>
+            </a:r>
+          </a:p>
+          <a:p>
+            <a:endParaRPr lang="en-US" dirty="0"/>
+          </a:p>
+        </p:txBody>
+      </p:sp>
+    </p:spTree>
+    <p:extLst>
+      <p:ext uri="{BB962C8B-B14F-4D97-AF65-F5344CB8AC3E}">
+        <p14:creationId xmlns:p14="http://schemas.microsoft.com/office/powerpoint/2010/main" val="1441951056"/>
+      </p:ext>
+    </p:extLst>
+  </p:cSld>
+  <p:clrMapOvr>
+    <a:masterClrMapping/>
+  </p:clrMapOvr>
+</p:sld>
+</file>
+
+<file path=ppt/slides/slide14.xml><?xml version="1.0" encoding="utf-8"?>
+<p:sld xmlns:a="http://schemas.openxmlformats.org/drawingml/2006/main" xmlns:r="http://schemas.openxmlformats.org/officeDocument/2006/relationships" xmlns:p="http://schemas.openxmlformats.org/presentationml/2006/main">
+  <p:cSld>
+    <p:spTree>
+      <p:nvGrpSpPr>
+        <p:cNvPr id="1" name=""/>
+        <p:cNvGrpSpPr/>
+        <p:nvPr/>
+      </p:nvGrpSpPr>
+      <p:grpSpPr>
+        <a:xfrm>
+          <a:off x="0" y="0"/>
+          <a:ext cx="0" cy="0"/>
+          <a:chOff x="0" y="0"/>
+          <a:chExt cx="0" cy="0"/>
+        </a:xfrm>
+      </p:grpSpPr>
+      <p:sp>
+        <p:nvSpPr>
+          <p:cNvPr id="2" name="Title 1">
+            <a:extLst>
+              <a:ext uri="{FF2B5EF4-FFF2-40B4-BE49-F238E27FC236}">
+                <a16:creationId xmlns:a16="http://schemas.microsoft.com/office/drawing/2014/main" id="{03118ABC-56A3-56FF-96AA-262881167296}"/>
+              </a:ext>
+            </a:extLst>
+          </p:cNvPr>
+          <p:cNvSpPr>
+            <a:spLocks noGrp="1"/>
+          </p:cNvSpPr>
+          <p:nvPr>
+            <p:ph type="title"/>
+          </p:nvPr>
+        </p:nvSpPr>
+        <p:spPr>
+          <a:xfrm>
+            <a:off x="838200" y="365125"/>
+            <a:ext cx="4991100" cy="1325563"/>
+          </a:xfrm>
+        </p:spPr>
+        <p:txBody>
+          <a:bodyPr/>
+          <a:lstStyle/>
+          <a:p>
+            <a:r>
+              <a:rPr lang="en-US" dirty="0">
+                <a:latin typeface="Arial Rounded MT Bold" panose="020F0704030504030204" pitchFamily="34" charset="0"/>
+              </a:rPr>
+              <a:t>IMPACT ON SOCIETY </a:t>
+            </a:r>
+          </a:p>
+        </p:txBody>
+      </p:sp>
+      <p:sp>
+        <p:nvSpPr>
+          <p:cNvPr id="3" name="Content Placeholder 2">
+            <a:extLst>
+              <a:ext uri="{FF2B5EF4-FFF2-40B4-BE49-F238E27FC236}">
+                <a16:creationId xmlns:a16="http://schemas.microsoft.com/office/drawing/2014/main" id="{F92BF3C0-F53D-467D-1950-52B3E52B5735}"/>
+              </a:ext>
+            </a:extLst>
+          </p:cNvPr>
+          <p:cNvSpPr>
+            <a:spLocks noGrp="1"/>
+          </p:cNvSpPr>
+          <p:nvPr>
+            <p:ph idx="1"/>
+          </p:nvPr>
+        </p:nvSpPr>
+        <p:spPr/>
+        <p:txBody>
+          <a:bodyPr/>
+          <a:lstStyle/>
+          <a:p>
+            <a:pPr marL="0" indent="0" algn="just">
+              <a:buNone/>
+            </a:pPr>
+            <a:r>
+              <a:rPr lang="en-US" b="1" i="0" dirty="0">
+                <a:effectLst/>
+                <a:latin typeface="Söhne"/>
+              </a:rPr>
+              <a:t>Safety and Security Concerns</a:t>
+            </a:r>
+            <a:endParaRPr lang="en-US" b="0" i="0" dirty="0">
+              <a:effectLst/>
+              <a:latin typeface="Söhne"/>
+            </a:endParaRPr>
+          </a:p>
+          <a:p>
+            <a:pPr marL="0" indent="0" algn="just">
+              <a:buNone/>
+            </a:pPr>
+            <a:r>
+              <a:rPr lang="en-US" sz="2000" b="0" i="0" dirty="0">
+                <a:effectLst/>
+                <a:latin typeface="Söhne"/>
+              </a:rPr>
+              <a:t>High crime rates can lead to feelings of insecurity among the general population, affecting people's daily lives, routines, and overall well-being.</a:t>
+            </a:r>
+          </a:p>
+          <a:p>
+            <a:pPr marL="0" indent="0" algn="just">
+              <a:buNone/>
+            </a:pPr>
+            <a:r>
+              <a:rPr lang="en-US" b="1" i="0" dirty="0">
+                <a:effectLst/>
+                <a:latin typeface="Söhne"/>
+              </a:rPr>
+              <a:t>Economic Effects</a:t>
+            </a:r>
+            <a:endParaRPr lang="en-US" b="0" i="0" dirty="0">
+              <a:effectLst/>
+              <a:latin typeface="Söhne"/>
+            </a:endParaRPr>
+          </a:p>
+          <a:p>
+            <a:pPr marL="0" indent="0" algn="just">
+              <a:buNone/>
+            </a:pPr>
+            <a:r>
+              <a:rPr lang="en-US" b="0" i="0" dirty="0">
+                <a:effectLst/>
+                <a:latin typeface="Söhne"/>
+              </a:rPr>
+              <a:t> </a:t>
+            </a:r>
+            <a:r>
+              <a:rPr lang="en-US" sz="2000" b="0" i="0" dirty="0">
+                <a:effectLst/>
+                <a:latin typeface="Söhne"/>
+              </a:rPr>
+              <a:t>Crimes can negatively impact the economy by deterring foreign investment, hindering business growth, and increasing costs related to security and law enforcement. The fear of crime might lead to reduced consumer spending and tourism, affecting various sectors</a:t>
+            </a:r>
+          </a:p>
+          <a:p>
+            <a:endParaRPr lang="en-US" dirty="0"/>
+          </a:p>
+        </p:txBody>
+      </p:sp>
+    </p:spTree>
+    <p:extLst>
+      <p:ext uri="{BB962C8B-B14F-4D97-AF65-F5344CB8AC3E}">
+        <p14:creationId xmlns:p14="http://schemas.microsoft.com/office/powerpoint/2010/main" val="3826100224"/>
+      </p:ext>
+    </p:extLst>
+  </p:cSld>
+  <p:clrMapOvr>
+    <a:masterClrMapping/>
+  </p:clrMapOvr>
+</p:sld>
+</file>
+
+<file path=ppt/slides/slide15.xml><?xml version="1.0" encoding="utf-8"?>
+<p:sld xmlns:a="http://schemas.openxmlformats.org/drawingml/2006/main" xmlns:r="http://schemas.openxmlformats.org/officeDocument/2006/relationships" xmlns:p="http://schemas.openxmlformats.org/presentationml/2006/main">
+  <p:cSld>
+    <p:spTree>
+      <p:nvGrpSpPr>
+        <p:cNvPr id="1" name=""/>
+        <p:cNvGrpSpPr/>
+        <p:nvPr/>
+      </p:nvGrpSpPr>
+      <p:grpSpPr>
+        <a:xfrm>
+          <a:off x="0" y="0"/>
+          <a:ext cx="0" cy="0"/>
+          <a:chOff x="0" y="0"/>
+          <a:chExt cx="0" cy="0"/>
+        </a:xfrm>
+      </p:grpSpPr>
+      <p:sp>
+        <p:nvSpPr>
+          <p:cNvPr id="2" name="Title 1">
+            <a:extLst>
+              <a:ext uri="{FF2B5EF4-FFF2-40B4-BE49-F238E27FC236}">
+                <a16:creationId xmlns:a16="http://schemas.microsoft.com/office/drawing/2014/main" id="{03118ABC-56A3-56FF-96AA-262881167296}"/>
+              </a:ext>
+            </a:extLst>
+          </p:cNvPr>
+          <p:cNvSpPr>
+            <a:spLocks noGrp="1"/>
+          </p:cNvSpPr>
+          <p:nvPr>
+            <p:ph type="title"/>
+          </p:nvPr>
+        </p:nvSpPr>
+        <p:spPr>
+          <a:xfrm>
+            <a:off x="838200" y="365125"/>
+            <a:ext cx="4991100" cy="1325563"/>
+          </a:xfrm>
+        </p:spPr>
+        <p:txBody>
+          <a:bodyPr/>
+          <a:lstStyle/>
+          <a:p>
+            <a:r>
+              <a:rPr lang="en-US" dirty="0">
+                <a:latin typeface="Arial Rounded MT Bold" panose="020F0704030504030204" pitchFamily="34" charset="0"/>
+              </a:rPr>
+              <a:t>IMPACT ON SOCIETY </a:t>
+            </a:r>
+          </a:p>
+        </p:txBody>
+      </p:sp>
+      <p:sp>
+        <p:nvSpPr>
+          <p:cNvPr id="3" name="Content Placeholder 2">
+            <a:extLst>
+              <a:ext uri="{FF2B5EF4-FFF2-40B4-BE49-F238E27FC236}">
+                <a16:creationId xmlns:a16="http://schemas.microsoft.com/office/drawing/2014/main" id="{F92BF3C0-F53D-467D-1950-52B3E52B5735}"/>
+              </a:ext>
+            </a:extLst>
+          </p:cNvPr>
+          <p:cNvSpPr>
+            <a:spLocks noGrp="1"/>
+          </p:cNvSpPr>
+          <p:nvPr>
+            <p:ph idx="1"/>
+          </p:nvPr>
+        </p:nvSpPr>
+        <p:spPr/>
+        <p:txBody>
+          <a:bodyPr>
+            <a:normAutofit/>
+          </a:bodyPr>
+          <a:lstStyle/>
+          <a:p>
+            <a:pPr marL="0" indent="0" algn="just">
+              <a:buNone/>
+            </a:pPr>
+            <a:r>
+              <a:rPr lang="en-US" b="1" i="0" dirty="0">
+                <a:effectLst/>
+                <a:latin typeface="Söhne"/>
+              </a:rPr>
+              <a:t>Social Disruption</a:t>
+            </a:r>
+            <a:r>
+              <a:rPr lang="en-US" b="0" i="0" dirty="0">
+                <a:effectLst/>
+                <a:latin typeface="Söhne"/>
+              </a:rPr>
+              <a:t> </a:t>
+            </a:r>
+          </a:p>
+          <a:p>
+            <a:pPr marL="0" indent="0" algn="just">
+              <a:buNone/>
+            </a:pPr>
+            <a:r>
+              <a:rPr lang="en-US" sz="2000" b="0" i="0" dirty="0">
+                <a:effectLst/>
+                <a:latin typeface="Söhne"/>
+              </a:rPr>
+              <a:t>Crimes can disrupt the social fabric of a society, eroding trust and community cohesion. People might become more isolated, leading to a breakdown in social relationships and support networks.</a:t>
+            </a:r>
+          </a:p>
+          <a:p>
+            <a:pPr marL="0" indent="0" algn="just">
+              <a:buNone/>
+            </a:pPr>
+            <a:r>
+              <a:rPr lang="en-US" b="1" i="0" dirty="0">
+                <a:effectLst/>
+                <a:latin typeface="Söhne"/>
+              </a:rPr>
+              <a:t>Psychological Impact</a:t>
+            </a:r>
+            <a:endParaRPr lang="en-US" b="0" i="0" dirty="0">
+              <a:effectLst/>
+              <a:latin typeface="Söhne"/>
+            </a:endParaRPr>
+          </a:p>
+          <a:p>
+            <a:pPr marL="0" indent="0" algn="just">
+              <a:buNone/>
+            </a:pPr>
+            <a:r>
+              <a:rPr lang="en-US" sz="2000" b="0" i="0" dirty="0">
+                <a:effectLst/>
+                <a:latin typeface="Söhne"/>
+              </a:rPr>
+              <a:t>Crimes can cause psychological trauma not only for victims but also witnesses and the larger community. This trauma can have long-lasting effects on mental health and well-being.</a:t>
+            </a:r>
+          </a:p>
+          <a:p>
+            <a:pPr marL="0" indent="0" algn="just">
+              <a:buNone/>
+            </a:pPr>
+            <a:r>
+              <a:rPr lang="en-US" b="1" i="0" dirty="0">
+                <a:effectLst/>
+                <a:latin typeface="Söhne"/>
+              </a:rPr>
+              <a:t>Healthcare Burden</a:t>
+            </a:r>
+            <a:endParaRPr lang="en-US" b="0" i="0" dirty="0">
+              <a:effectLst/>
+              <a:latin typeface="Söhne"/>
+            </a:endParaRPr>
+          </a:p>
+          <a:p>
+            <a:pPr marL="0" indent="0" algn="just">
+              <a:buNone/>
+            </a:pPr>
+            <a:r>
+              <a:rPr lang="en-US" sz="2000" b="0" i="0" dirty="0">
+                <a:effectLst/>
+                <a:latin typeface="Söhne"/>
+              </a:rPr>
+              <a:t>Healthcare resources may be diverted to treat victims of crime, adding to the strain on an already stretched healthcare system.</a:t>
+            </a:r>
+          </a:p>
+          <a:p>
+            <a:pPr marL="0" indent="0">
+              <a:buNone/>
+            </a:pPr>
+            <a:endParaRPr lang="en-US" dirty="0"/>
+          </a:p>
+        </p:txBody>
+      </p:sp>
+    </p:spTree>
+    <p:extLst>
+      <p:ext uri="{BB962C8B-B14F-4D97-AF65-F5344CB8AC3E}">
+        <p14:creationId xmlns:p14="http://schemas.microsoft.com/office/powerpoint/2010/main" val="1739407641"/>
+      </p:ext>
+    </p:extLst>
+  </p:cSld>
+  <p:clrMapOvr>
+    <a:masterClrMapping/>
+  </p:clrMapOvr>
+</p:sld>
+</file>
+
+<file path=ppt/slides/slide16.xml><?xml version="1.0" encoding="utf-8"?>
+<p:sld xmlns:a="http://schemas.openxmlformats.org/drawingml/2006/main" xmlns:r="http://schemas.openxmlformats.org/officeDocument/2006/relationships" xmlns:p="http://schemas.openxmlformats.org/presentationml/2006/main">
+  <p:cSld>
+    <p:spTree>
+      <p:nvGrpSpPr>
+        <p:cNvPr id="1" name=""/>
+        <p:cNvGrpSpPr/>
+        <p:nvPr/>
+      </p:nvGrpSpPr>
+      <p:grpSpPr>
+        <a:xfrm>
+          <a:off x="0" y="0"/>
+          <a:ext cx="0" cy="0"/>
+          <a:chOff x="0" y="0"/>
+          <a:chExt cx="0" cy="0"/>
+        </a:xfrm>
+      </p:grpSpPr>
+      <p:sp>
+        <p:nvSpPr>
+          <p:cNvPr id="2" name="Title 1">
+            <a:extLst>
+              <a:ext uri="{FF2B5EF4-FFF2-40B4-BE49-F238E27FC236}">
+                <a16:creationId xmlns:a16="http://schemas.microsoft.com/office/drawing/2014/main" id="{03118ABC-56A3-56FF-96AA-262881167296}"/>
+              </a:ext>
+            </a:extLst>
+          </p:cNvPr>
+          <p:cNvSpPr>
+            <a:spLocks noGrp="1"/>
+          </p:cNvSpPr>
+          <p:nvPr>
+            <p:ph type="title"/>
+          </p:nvPr>
+        </p:nvSpPr>
+        <p:spPr>
+          <a:xfrm>
+            <a:off x="838200" y="365125"/>
+            <a:ext cx="4991100" cy="1325563"/>
+          </a:xfrm>
+        </p:spPr>
+        <p:txBody>
+          <a:bodyPr/>
+          <a:lstStyle/>
+          <a:p>
+            <a:r>
+              <a:rPr lang="en-US" dirty="0">
+                <a:latin typeface="Arial Rounded MT Bold" panose="020F0704030504030204" pitchFamily="34" charset="0"/>
+              </a:rPr>
+              <a:t>IMPACT ON SOCIETY </a:t>
+            </a:r>
+          </a:p>
+        </p:txBody>
+      </p:sp>
+      <p:sp>
+        <p:nvSpPr>
+          <p:cNvPr id="3" name="Content Placeholder 2">
+            <a:extLst>
+              <a:ext uri="{FF2B5EF4-FFF2-40B4-BE49-F238E27FC236}">
+                <a16:creationId xmlns:a16="http://schemas.microsoft.com/office/drawing/2014/main" id="{F92BF3C0-F53D-467D-1950-52B3E52B5735}"/>
+              </a:ext>
+            </a:extLst>
+          </p:cNvPr>
+          <p:cNvSpPr>
+            <a:spLocks noGrp="1"/>
+          </p:cNvSpPr>
+          <p:nvPr>
+            <p:ph idx="1"/>
+          </p:nvPr>
+        </p:nvSpPr>
+        <p:spPr/>
+        <p:txBody>
+          <a:bodyPr>
+            <a:normAutofit/>
+          </a:bodyPr>
+          <a:lstStyle/>
+          <a:p>
+            <a:pPr marL="0" indent="0" algn="just">
+              <a:buNone/>
+            </a:pPr>
+            <a:r>
+              <a:rPr lang="en-US" b="1" i="0" dirty="0">
+                <a:effectLst/>
+                <a:latin typeface="Söhne"/>
+              </a:rPr>
+              <a:t>Educational Disruption</a:t>
+            </a:r>
+            <a:r>
+              <a:rPr lang="en-US" b="0" i="0" dirty="0">
+                <a:effectLst/>
+                <a:latin typeface="Söhne"/>
+              </a:rPr>
+              <a:t> </a:t>
+            </a:r>
+          </a:p>
+          <a:p>
+            <a:pPr marL="0" indent="0" algn="just">
+              <a:buNone/>
+            </a:pPr>
+            <a:r>
+              <a:rPr lang="en-US" sz="1900" b="0" i="0" dirty="0">
+                <a:effectLst/>
+                <a:latin typeface="Söhne"/>
+              </a:rPr>
+              <a:t>High crime rates can disrupt education, as students and parents might fear going to schools located in unsafe areas. This can lead to decreased educational attainment and future opportunities for young people.</a:t>
+            </a:r>
+          </a:p>
+          <a:p>
+            <a:pPr marL="0" indent="0" algn="just">
+              <a:buNone/>
+            </a:pPr>
+            <a:r>
+              <a:rPr lang="en-US" b="1" i="0" dirty="0">
+                <a:effectLst/>
+                <a:latin typeface="Söhne"/>
+              </a:rPr>
+              <a:t>Decreased Productivity</a:t>
+            </a:r>
+            <a:endParaRPr lang="en-US" b="0" i="0" dirty="0">
+              <a:effectLst/>
+              <a:latin typeface="Söhne"/>
+            </a:endParaRPr>
+          </a:p>
+          <a:p>
+            <a:pPr marL="0" indent="0" algn="just">
+              <a:buNone/>
+            </a:pPr>
+            <a:r>
+              <a:rPr lang="en-US" sz="2000" b="0" i="0" dirty="0">
+                <a:effectLst/>
+                <a:latin typeface="Söhne"/>
+              </a:rPr>
+              <a:t>Crime can lead to increased absenteeism, decreased work productivity, and a generally disrupted work environment, affecting economic productivity on an individual and societal level</a:t>
+            </a:r>
+            <a:endParaRPr lang="en-US" b="0" i="0" dirty="0">
+              <a:effectLst/>
+              <a:latin typeface="Söhne"/>
+            </a:endParaRPr>
+          </a:p>
+          <a:p>
+            <a:pPr marL="0" indent="0" algn="just">
+              <a:buNone/>
+            </a:pPr>
+            <a:r>
+              <a:rPr lang="en-US" b="1" i="0" dirty="0">
+                <a:effectLst/>
+                <a:latin typeface="Söhne"/>
+              </a:rPr>
+              <a:t>Legal and Judicial Strain</a:t>
+            </a:r>
+            <a:r>
+              <a:rPr lang="en-US" b="0" i="0" dirty="0">
+                <a:effectLst/>
+                <a:latin typeface="Söhne"/>
+              </a:rPr>
+              <a:t> </a:t>
+            </a:r>
+          </a:p>
+          <a:p>
+            <a:pPr marL="0" indent="0" algn="just">
+              <a:buNone/>
+            </a:pPr>
+            <a:r>
+              <a:rPr lang="en-US" sz="2000" b="0" i="0" dirty="0">
+                <a:effectLst/>
+                <a:latin typeface="Söhne"/>
+              </a:rPr>
+              <a:t>High crime rates can strain the legal and judicial systems, leading to backlogs in court cases, increased workload for law enforcement, and potential corruption within these systems</a:t>
+            </a:r>
+          </a:p>
+          <a:p>
+            <a:pPr marL="0" indent="0" algn="just">
+              <a:buNone/>
+            </a:pPr>
+            <a:endParaRPr lang="en-US" sz="2000" b="0" i="0" dirty="0">
+              <a:effectLst/>
+              <a:latin typeface="Söhne"/>
+            </a:endParaRPr>
+          </a:p>
+          <a:p>
+            <a:pPr marL="0" indent="0" algn="just">
+              <a:buNone/>
+            </a:pPr>
+            <a:endParaRPr lang="en-US" dirty="0"/>
+          </a:p>
+        </p:txBody>
+      </p:sp>
+    </p:spTree>
+    <p:extLst>
+      <p:ext uri="{BB962C8B-B14F-4D97-AF65-F5344CB8AC3E}">
+        <p14:creationId xmlns:p14="http://schemas.microsoft.com/office/powerpoint/2010/main" val="1906204635"/>
+      </p:ext>
+    </p:extLst>
+  </p:cSld>
+  <p:clrMapOvr>
+    <a:masterClrMapping/>
+  </p:clrMapOvr>
+</p:sld>
+</file>
+
+<file path=ppt/slides/slide17.xml><?xml version="1.0" encoding="utf-8"?>
+<p:sld xmlns:a="http://schemas.openxmlformats.org/drawingml/2006/main" xmlns:r="http://schemas.openxmlformats.org/officeDocument/2006/relationships" xmlns:p="http://schemas.openxmlformats.org/presentationml/2006/main">
+  <p:cSld>
+    <p:spTree>
+      <p:nvGrpSpPr>
+        <p:cNvPr id="1" name=""/>
+        <p:cNvGrpSpPr/>
+        <p:nvPr/>
+      </p:nvGrpSpPr>
+      <p:grpSpPr>
+        <a:xfrm>
+          <a:off x="0" y="0"/>
+          <a:ext cx="0" cy="0"/>
+          <a:chOff x="0" y="0"/>
+          <a:chExt cx="0" cy="0"/>
+        </a:xfrm>
+      </p:grpSpPr>
+      <p:sp>
+        <p:nvSpPr>
+          <p:cNvPr id="2" name="Title 1">
+            <a:extLst>
+              <a:ext uri="{FF2B5EF4-FFF2-40B4-BE49-F238E27FC236}">
+                <a16:creationId xmlns:a16="http://schemas.microsoft.com/office/drawing/2014/main" id="{03118ABC-56A3-56FF-96AA-262881167296}"/>
+              </a:ext>
+            </a:extLst>
+          </p:cNvPr>
+          <p:cNvSpPr>
+            <a:spLocks noGrp="1"/>
+          </p:cNvSpPr>
+          <p:nvPr>
+            <p:ph type="title"/>
+          </p:nvPr>
+        </p:nvSpPr>
+        <p:spPr>
+          <a:xfrm>
+            <a:off x="838200" y="365125"/>
+            <a:ext cx="4991100" cy="1325563"/>
+          </a:xfrm>
+        </p:spPr>
+        <p:txBody>
+          <a:bodyPr/>
+          <a:lstStyle/>
+          <a:p>
+            <a:r>
+              <a:rPr lang="en-US" dirty="0">
+                <a:latin typeface="Arial Rounded MT Bold" panose="020F0704030504030204" pitchFamily="34" charset="0"/>
+              </a:rPr>
+              <a:t>IMPACT ON SOCIETY </a:t>
+            </a:r>
+          </a:p>
+        </p:txBody>
+      </p:sp>
+      <p:sp>
+        <p:nvSpPr>
+          <p:cNvPr id="3" name="Content Placeholder 2">
+            <a:extLst>
+              <a:ext uri="{FF2B5EF4-FFF2-40B4-BE49-F238E27FC236}">
+                <a16:creationId xmlns:a16="http://schemas.microsoft.com/office/drawing/2014/main" id="{F92BF3C0-F53D-467D-1950-52B3E52B5735}"/>
+              </a:ext>
+            </a:extLst>
+          </p:cNvPr>
+          <p:cNvSpPr>
+            <a:spLocks noGrp="1"/>
+          </p:cNvSpPr>
+          <p:nvPr>
+            <p:ph idx="1"/>
+          </p:nvPr>
+        </p:nvSpPr>
+        <p:spPr/>
+        <p:txBody>
+          <a:bodyPr>
+            <a:normAutofit/>
+          </a:bodyPr>
+          <a:lstStyle/>
+          <a:p>
+            <a:pPr marL="0" indent="0" algn="just">
+              <a:buNone/>
+            </a:pPr>
+            <a:r>
+              <a:rPr lang="en-US" b="1" i="0" dirty="0">
+                <a:effectLst/>
+                <a:latin typeface="Söhne"/>
+              </a:rPr>
+              <a:t>Stigma and Discrimination</a:t>
+            </a:r>
+            <a:r>
+              <a:rPr lang="en-US" b="0" i="0" dirty="0">
+                <a:effectLst/>
+                <a:latin typeface="Söhne"/>
+              </a:rPr>
+              <a:t> </a:t>
+            </a:r>
+          </a:p>
+          <a:p>
+            <a:pPr marL="0" indent="0" algn="just">
+              <a:buNone/>
+            </a:pPr>
+            <a:r>
+              <a:rPr lang="en-US" sz="2200" b="0" i="0" dirty="0">
+                <a:effectLst/>
+                <a:latin typeface="Söhne"/>
+              </a:rPr>
+              <a:t>Certain crimes can lead to stigmatization of specific communities, further dividing society along ethnic, religious, or socioeconomic lines</a:t>
+            </a:r>
+          </a:p>
+          <a:p>
+            <a:pPr marL="0" indent="0" algn="just">
+              <a:buNone/>
+            </a:pPr>
+            <a:r>
+              <a:rPr lang="en-US" b="1" i="0" dirty="0">
+                <a:effectLst/>
+                <a:latin typeface="Söhne"/>
+              </a:rPr>
+              <a:t>Migration and Urbanization</a:t>
+            </a:r>
+            <a:endParaRPr lang="en-US" b="0" i="0" dirty="0">
+              <a:effectLst/>
+              <a:latin typeface="Söhne"/>
+            </a:endParaRPr>
+          </a:p>
+          <a:p>
+            <a:pPr marL="0" indent="0" algn="just">
+              <a:buNone/>
+            </a:pPr>
+            <a:r>
+              <a:rPr lang="en-US" sz="2000" b="0" i="0" dirty="0">
+                <a:effectLst/>
+                <a:latin typeface="Söhne"/>
+              </a:rPr>
+              <a:t>Crime can influence migration patterns as people may move away from high-crime areas, leading to uneven urbanization and potential overcrowding in safer areas</a:t>
+            </a:r>
+          </a:p>
+          <a:p>
+            <a:pPr marL="0" indent="0" algn="just">
+              <a:buNone/>
+            </a:pPr>
+            <a:r>
+              <a:rPr lang="en-US" b="1" i="0" dirty="0">
+                <a:effectLst/>
+                <a:latin typeface="Söhne"/>
+              </a:rPr>
+              <a:t>Impact on Tourism</a:t>
+            </a:r>
+            <a:endParaRPr lang="en-US" b="0" i="0" dirty="0">
+              <a:effectLst/>
+              <a:latin typeface="Söhne"/>
+            </a:endParaRPr>
+          </a:p>
+          <a:p>
+            <a:pPr marL="0" indent="0" algn="just">
+              <a:buNone/>
+            </a:pPr>
+            <a:r>
+              <a:rPr lang="en-US" sz="2000" b="0" i="0" dirty="0">
+                <a:effectLst/>
+                <a:latin typeface="Söhne"/>
+              </a:rPr>
+              <a:t>Crime can deter tourists from visiting a country, leading to decreased revenue for the tourism industry and affecting local economies that rely on tourism</a:t>
+            </a:r>
+          </a:p>
+          <a:p>
+            <a:pPr marL="0" indent="0" algn="just">
+              <a:buNone/>
+            </a:pPr>
+            <a:endParaRPr lang="en-US" sz="2000" b="0" i="0" dirty="0">
+              <a:effectLst/>
+              <a:latin typeface="Söhne"/>
+            </a:endParaRPr>
+          </a:p>
+          <a:p>
+            <a:pPr marL="0" indent="0" algn="just">
+              <a:buNone/>
+            </a:pPr>
+            <a:endParaRPr lang="en-US" dirty="0"/>
+          </a:p>
+        </p:txBody>
+      </p:sp>
+    </p:spTree>
+    <p:extLst>
+      <p:ext uri="{BB962C8B-B14F-4D97-AF65-F5344CB8AC3E}">
+        <p14:creationId xmlns:p14="http://schemas.microsoft.com/office/powerpoint/2010/main" val="1530699631"/>
+      </p:ext>
+    </p:extLst>
+  </p:cSld>
+  <p:clrMapOvr>
+    <a:masterClrMapping/>
   </p:clrMapOvr>
 </p:sld>
 </file>
@@ -27277,7 +28897,7 @@
         </p:nvSpPr>
         <p:spPr>
           <a:xfrm>
-            <a:off x="3352800" y="290512"/>
+            <a:off x="3352800" y="285750"/>
             <a:ext cx="2019300" cy="609600"/>
           </a:xfrm>
           <a:prstGeom prst="rect">
@@ -27855,6 +29475,254 @@
     <p:extLst>
       <p:ext uri="{BB962C8B-B14F-4D97-AF65-F5344CB8AC3E}">
         <p14:creationId xmlns:p14="http://schemas.microsoft.com/office/powerpoint/2010/main" val="1007000494"/>
+      </p:ext>
+    </p:extLst>
+  </p:cSld>
+  <p:clrMapOvr>
+    <a:masterClrMapping/>
+  </p:clrMapOvr>
+</p:sld>
+</file>
+
+<file path=ppt/slides/slide9.xml><?xml version="1.0" encoding="utf-8"?>
+<p:sld xmlns:a="http://schemas.openxmlformats.org/drawingml/2006/main" xmlns:r="http://schemas.openxmlformats.org/officeDocument/2006/relationships" xmlns:p="http://schemas.openxmlformats.org/presentationml/2006/main">
+  <p:cSld>
+    <p:spTree>
+      <p:nvGrpSpPr>
+        <p:cNvPr id="1" name=""/>
+        <p:cNvGrpSpPr/>
+        <p:nvPr/>
+      </p:nvGrpSpPr>
+      <p:grpSpPr>
+        <a:xfrm>
+          <a:off x="0" y="0"/>
+          <a:ext cx="0" cy="0"/>
+          <a:chOff x="0" y="0"/>
+          <a:chExt cx="0" cy="0"/>
+        </a:xfrm>
+      </p:grpSpPr>
+      <p:sp>
+        <p:nvSpPr>
+          <p:cNvPr id="2" name="Title 1">
+            <a:extLst>
+              <a:ext uri="{FF2B5EF4-FFF2-40B4-BE49-F238E27FC236}">
+                <a16:creationId xmlns:a16="http://schemas.microsoft.com/office/drawing/2014/main" id="{F9E382D1-B4FF-C433-F3E5-0D8E8837DC7C}"/>
+              </a:ext>
+            </a:extLst>
+          </p:cNvPr>
+          <p:cNvSpPr>
+            <a:spLocks noGrp="1"/>
+          </p:cNvSpPr>
+          <p:nvPr>
+            <p:ph type="title"/>
+          </p:nvPr>
+        </p:nvSpPr>
+        <p:spPr>
+          <a:xfrm>
+            <a:off x="704850" y="-72232"/>
+            <a:ext cx="4743450" cy="1325563"/>
+          </a:xfrm>
+        </p:spPr>
+        <p:txBody>
+          <a:bodyPr/>
+          <a:lstStyle/>
+          <a:p>
+            <a:r>
+              <a:rPr lang="en-US" dirty="0">
+                <a:latin typeface="Arial Rounded MT Bold" panose="020F0704030504030204" pitchFamily="34" charset="0"/>
+              </a:rPr>
+              <a:t>CAUSES OF</a:t>
+            </a:r>
+          </a:p>
+        </p:txBody>
+      </p:sp>
+      <p:sp>
+        <p:nvSpPr>
+          <p:cNvPr id="3" name="Content Placeholder 2">
+            <a:extLst>
+              <a:ext uri="{FF2B5EF4-FFF2-40B4-BE49-F238E27FC236}">
+                <a16:creationId xmlns:a16="http://schemas.microsoft.com/office/drawing/2014/main" id="{F75A88C0-E201-8D64-161A-79C63A582631}"/>
+              </a:ext>
+            </a:extLst>
+          </p:cNvPr>
+          <p:cNvSpPr>
+            <a:spLocks noGrp="1"/>
+          </p:cNvSpPr>
+          <p:nvPr>
+            <p:ph idx="1"/>
+          </p:nvPr>
+        </p:nvSpPr>
+        <p:spPr/>
+        <p:txBody>
+          <a:bodyPr>
+            <a:normAutofit/>
+          </a:bodyPr>
+          <a:lstStyle/>
+          <a:p>
+            <a:pPr marL="0" indent="0">
+              <a:buNone/>
+            </a:pPr>
+            <a:r>
+              <a:rPr lang="en-US" b="1" i="0" dirty="0">
+                <a:solidFill>
+                  <a:srgbClr val="232323"/>
+                </a:solidFill>
+                <a:effectLst/>
+                <a:latin typeface="Verdana" panose="020B0604030504040204" pitchFamily="34" charset="0"/>
+              </a:rPr>
+              <a:t>Impoverishment and unemployment</a:t>
+            </a:r>
+          </a:p>
+          <a:p>
+            <a:pPr marL="0" indent="0" algn="just">
+              <a:buNone/>
+            </a:pPr>
+            <a:r>
+              <a:rPr lang="en-US" sz="2000" dirty="0"/>
+              <a:t> </a:t>
+            </a:r>
+            <a:r>
+              <a:rPr lang="en-US" sz="2000" b="0" i="0" dirty="0">
+                <a:solidFill>
+                  <a:srgbClr val="232323"/>
+                </a:solidFill>
+                <a:effectLst/>
+                <a:latin typeface="Verdana" panose="020B0604030504040204" pitchFamily="34" charset="0"/>
+              </a:rPr>
+              <a:t>The impoverishment of Bangladesh peoples has been a troubling social. Shortly after independence, about 82% of rural areas, an estimated 35% of the population lives below the impoverishment line and approximately 21% of the population lives below the impoverishment line in urban areas ( </a:t>
+            </a:r>
+            <a:r>
+              <a:rPr lang="en-US" sz="2000" b="0" i="0" u="none" strike="noStrike" dirty="0">
+                <a:solidFill>
+                  <a:srgbClr val="0B4FA7"/>
+                </a:solidFill>
+                <a:effectLst/>
+                <a:latin typeface="Verdana" panose="020B0604030504040204" pitchFamily="34" charset="0"/>
+                <a:hlinkClick r:id="rId2"/>
+              </a:rPr>
+              <a:t>P.B., 2020</a:t>
+            </a:r>
+            <a:r>
+              <a:rPr lang="en-US" sz="2000" b="0" i="0" dirty="0">
+                <a:solidFill>
+                  <a:srgbClr val="232323"/>
+                </a:solidFill>
+                <a:effectLst/>
+                <a:latin typeface="Verdana" panose="020B0604030504040204" pitchFamily="34" charset="0"/>
+              </a:rPr>
+              <a:t>). These Bangladeshis have poor access to health care and safe drinking water ( </a:t>
+            </a:r>
+            <a:r>
+              <a:rPr lang="en-US" sz="2000" b="0" i="0" u="none" strike="noStrike" dirty="0">
+                <a:solidFill>
+                  <a:srgbClr val="0B4FA7"/>
+                </a:solidFill>
+                <a:effectLst/>
+                <a:latin typeface="Verdana" panose="020B0604030504040204" pitchFamily="34" charset="0"/>
+                <a:hlinkClick r:id="rId3"/>
+              </a:rPr>
+              <a:t>Jahan, 2018</a:t>
+            </a:r>
+            <a:r>
+              <a:rPr lang="en-US" sz="2000" b="0" i="0" dirty="0">
+                <a:solidFill>
+                  <a:srgbClr val="232323"/>
+                </a:solidFill>
+                <a:effectLst/>
+                <a:latin typeface="Verdana" panose="020B0604030504040204" pitchFamily="34" charset="0"/>
+              </a:rPr>
+              <a:t>). The rapidly increasing population increase is one of the major causes of rural impoverishment. the population stayed below the impoverishment line.</a:t>
+            </a:r>
+            <a:r>
+              <a:rPr lang="en-US" sz="1400" b="0" i="0" dirty="0">
+                <a:solidFill>
+                  <a:srgbClr val="232323"/>
+                </a:solidFill>
+                <a:effectLst/>
+                <a:latin typeface="Verdana" panose="020B0604030504040204" pitchFamily="34" charset="0"/>
+              </a:rPr>
+              <a:t> </a:t>
+            </a:r>
+            <a:r>
+              <a:rPr lang="en-US" sz="2000" b="0" i="0" dirty="0">
+                <a:solidFill>
+                  <a:srgbClr val="232323"/>
+                </a:solidFill>
+                <a:effectLst/>
+                <a:latin typeface="Verdana" panose="020B0604030504040204" pitchFamily="34" charset="0"/>
+              </a:rPr>
+              <a:t>Due to unemployment, most young people are involved in drugs and crime.</a:t>
+            </a:r>
+            <a:endParaRPr lang="en-US" sz="2000" dirty="0"/>
+          </a:p>
+        </p:txBody>
+      </p:sp>
+      <p:sp>
+        <p:nvSpPr>
+          <p:cNvPr id="6" name="Rectangle 5">
+            <a:extLst>
+              <a:ext uri="{FF2B5EF4-FFF2-40B4-BE49-F238E27FC236}">
+                <a16:creationId xmlns:a16="http://schemas.microsoft.com/office/drawing/2014/main" id="{1AF20BA7-48BA-7033-425F-9C7AE1D56D16}"/>
+              </a:ext>
+            </a:extLst>
+          </p:cNvPr>
+          <p:cNvSpPr/>
+          <p:nvPr/>
+        </p:nvSpPr>
+        <p:spPr>
+          <a:xfrm>
+            <a:off x="904875" y="929878"/>
+            <a:ext cx="2019300" cy="609600"/>
+          </a:xfrm>
+          <a:prstGeom prst="rect">
+            <a:avLst/>
+          </a:prstGeom>
+          <a:solidFill>
+            <a:srgbClr val="C00000"/>
+          </a:solidFill>
+        </p:spPr>
+        <p:style>
+          <a:lnRef idx="2">
+            <a:schemeClr val="accent1">
+              <a:shade val="15000"/>
+            </a:schemeClr>
+          </a:lnRef>
+          <a:fillRef idx="1">
+            <a:schemeClr val="accent1"/>
+          </a:fillRef>
+          <a:effectRef idx="0">
+            <a:schemeClr val="accent1"/>
+          </a:effectRef>
+          <a:fontRef idx="minor">
+            <a:schemeClr val="lt1"/>
+          </a:fontRef>
+        </p:style>
+        <p:txBody>
+          <a:bodyPr rtlCol="0" anchor="ctr"/>
+          <a:lstStyle/>
+          <a:p>
+            <a:pPr algn="ctr"/>
+            <a:r>
+              <a:rPr lang="en-US" sz="4400" dirty="0">
+                <a:solidFill>
+                  <a:schemeClr val="tx1"/>
+                </a:solidFill>
+                <a:latin typeface="Arial Rounded MT Bold" panose="020F0704030504030204" pitchFamily="34" charset="0"/>
+              </a:rPr>
+              <a:t>CRIME</a:t>
+            </a:r>
+            <a:endParaRPr lang="en-US" sz="4400" dirty="0">
+              <a:solidFill>
+                <a:schemeClr val="tx1"/>
+              </a:solidFill>
+            </a:endParaRPr>
+          </a:p>
+        </p:txBody>
+      </p:sp>
+    </p:spTree>
+    <p:extLst>
+      <p:ext uri="{BB962C8B-B14F-4D97-AF65-F5344CB8AC3E}">
+        <p14:creationId xmlns:p14="http://schemas.microsoft.com/office/powerpoint/2010/main" val="502889634"/>
       </p:ext>
     </p:extLst>
   </p:cSld>

</xml_diff>

<commit_message>
added strategies and recomm.
</commit_message>
<xml_diff>
--- a/BGS/FINAL PRESENTATION/CRIME IN DHAKA CITY.pptx
+++ b/BGS/FINAL PRESENTATION/CRIME IN DHAKA CITY.pptx
@@ -5,7 +5,7 @@
     <p:sldMasterId id="2147483801" r:id="rId1"/>
   </p:sldMasterIdLst>
   <p:notesMasterIdLst>
-    <p:notesMasterId r:id="rId19"/>
+    <p:notesMasterId r:id="rId24"/>
   </p:notesMasterIdLst>
   <p:sldIdLst>
     <p:sldId id="256" r:id="rId2"/>
@@ -25,6 +25,11 @@
     <p:sldId id="271" r:id="rId16"/>
     <p:sldId id="272" r:id="rId17"/>
     <p:sldId id="273" r:id="rId18"/>
+    <p:sldId id="274" r:id="rId19"/>
+    <p:sldId id="275" r:id="rId20"/>
+    <p:sldId id="276" r:id="rId21"/>
+    <p:sldId id="277" r:id="rId22"/>
+    <p:sldId id="278" r:id="rId23"/>
   </p:sldIdLst>
   <p:sldSz cx="12192000" cy="6858000"/>
   <p:notesSz cx="6858000" cy="9144000"/>
@@ -27820,6 +27825,420 @@
 </p:sld>
 </file>
 
+<file path=ppt/slides/slide18.xml><?xml version="1.0" encoding="utf-8"?>
+<p:sld xmlns:a="http://schemas.openxmlformats.org/drawingml/2006/main" xmlns:r="http://schemas.openxmlformats.org/officeDocument/2006/relationships" xmlns:p="http://schemas.openxmlformats.org/presentationml/2006/main">
+  <p:cSld>
+    <p:spTree>
+      <p:nvGrpSpPr>
+        <p:cNvPr id="1" name=""/>
+        <p:cNvGrpSpPr/>
+        <p:nvPr/>
+      </p:nvGrpSpPr>
+      <p:grpSpPr>
+        <a:xfrm>
+          <a:off x="0" y="0"/>
+          <a:ext cx="0" cy="0"/>
+          <a:chOff x="0" y="0"/>
+          <a:chExt cx="0" cy="0"/>
+        </a:xfrm>
+      </p:grpSpPr>
+      <p:sp>
+        <p:nvSpPr>
+          <p:cNvPr id="2" name="Title 1">
+            <a:extLst>
+              <a:ext uri="{FF2B5EF4-FFF2-40B4-BE49-F238E27FC236}">
+                <a16:creationId xmlns:a16="http://schemas.microsoft.com/office/drawing/2014/main" id="{F8A587C5-A4E7-DA8A-F86A-F67A9AD6FD04}"/>
+              </a:ext>
+            </a:extLst>
+          </p:cNvPr>
+          <p:cNvSpPr>
+            <a:spLocks noGrp="1"/>
+          </p:cNvSpPr>
+          <p:nvPr>
+            <p:ph type="title"/>
+          </p:nvPr>
+        </p:nvSpPr>
+        <p:spPr>
+          <a:xfrm>
+            <a:off x="838200" y="365125"/>
+            <a:ext cx="7600950" cy="1325563"/>
+          </a:xfrm>
+        </p:spPr>
+        <p:txBody>
+          <a:bodyPr/>
+          <a:lstStyle/>
+          <a:p>
+            <a:r>
+              <a:rPr lang="en-US" dirty="0">
+                <a:latin typeface="Arial Rounded MT Bold" panose="020F0704030504030204" pitchFamily="34" charset="0"/>
+              </a:rPr>
+              <a:t>STRATEGIES AND RECOMMENDATIONS</a:t>
+            </a:r>
+          </a:p>
+        </p:txBody>
+      </p:sp>
+      <p:sp>
+        <p:nvSpPr>
+          <p:cNvPr id="3" name="Content Placeholder 2">
+            <a:extLst>
+              <a:ext uri="{FF2B5EF4-FFF2-40B4-BE49-F238E27FC236}">
+                <a16:creationId xmlns:a16="http://schemas.microsoft.com/office/drawing/2014/main" id="{02B7C7C2-9B70-9F11-2CE2-FEFEC895A18F}"/>
+              </a:ext>
+            </a:extLst>
+          </p:cNvPr>
+          <p:cNvSpPr>
+            <a:spLocks noGrp="1"/>
+          </p:cNvSpPr>
+          <p:nvPr>
+            <p:ph idx="1"/>
+          </p:nvPr>
+        </p:nvSpPr>
+        <p:spPr>
+          <a:xfrm>
+            <a:off x="838200" y="1854200"/>
+            <a:ext cx="10515600" cy="4351338"/>
+          </a:xfrm>
+        </p:spPr>
+        <p:txBody>
+          <a:bodyPr>
+            <a:normAutofit lnSpcReduction="10000"/>
+          </a:bodyPr>
+          <a:lstStyle/>
+          <a:p>
+            <a:pPr marL="0" indent="0" algn="just">
+              <a:buNone/>
+            </a:pPr>
+            <a:endParaRPr lang="en-US" sz="2000" b="0" i="0" dirty="0">
+              <a:effectLst/>
+              <a:latin typeface="Söhne"/>
+            </a:endParaRPr>
+          </a:p>
+          <a:p>
+            <a:pPr marL="0" indent="0" algn="l">
+              <a:buNone/>
+            </a:pPr>
+            <a:r>
+              <a:rPr lang="en-US" b="1" i="0" dirty="0">
+                <a:effectLst/>
+                <a:latin typeface="Söhne"/>
+              </a:rPr>
+              <a:t>Community Policing and Engagement</a:t>
+            </a:r>
+            <a:r>
+              <a:rPr lang="en-US" b="0" i="0" dirty="0">
+                <a:effectLst/>
+                <a:latin typeface="Söhne"/>
+              </a:rPr>
+              <a:t>: </a:t>
+            </a:r>
+          </a:p>
+          <a:p>
+            <a:pPr marL="0" indent="0" algn="l">
+              <a:buNone/>
+            </a:pPr>
+            <a:r>
+              <a:rPr lang="en-US" sz="2000" b="0" i="0" dirty="0">
+                <a:effectLst/>
+                <a:latin typeface="Söhne"/>
+              </a:rPr>
+              <a:t>Establish strong community-police partnerships to foster trust and collaboration. Encourage police officers to interact positively with residents, understand local concerns, and work together to address issues.</a:t>
+            </a:r>
+            <a:endParaRPr lang="en-US" sz="1400" b="0" i="0" dirty="0">
+              <a:effectLst/>
+              <a:latin typeface="Söhne"/>
+            </a:endParaRPr>
+          </a:p>
+          <a:p>
+            <a:pPr marL="0" indent="0" algn="l">
+              <a:buNone/>
+            </a:pPr>
+            <a:r>
+              <a:rPr lang="en-US" b="1" i="0" dirty="0">
+                <a:effectLst/>
+                <a:latin typeface="Söhne"/>
+              </a:rPr>
+              <a:t>Enhanced Law Enforcement</a:t>
+            </a:r>
+            <a:r>
+              <a:rPr lang="en-US" b="0" i="0" dirty="0">
+                <a:effectLst/>
+                <a:latin typeface="Söhne"/>
+              </a:rPr>
+              <a:t>: I</a:t>
+            </a:r>
+          </a:p>
+          <a:p>
+            <a:pPr marL="0" indent="0" algn="l">
+              <a:buNone/>
+            </a:pPr>
+            <a:r>
+              <a:rPr lang="en-US" sz="2000" dirty="0">
+                <a:latin typeface="Söhne"/>
+              </a:rPr>
+              <a:t>Increase</a:t>
+            </a:r>
+            <a:r>
+              <a:rPr lang="en-US" sz="2000" b="0" i="0" dirty="0">
+                <a:effectLst/>
+                <a:latin typeface="Söhne"/>
+              </a:rPr>
+              <a:t> police presence in high-crime areas and implement effective patrolling strategies. Modernize the police force with technology, surveillance, and data-driven crime analysis to better allocate resources.</a:t>
+            </a:r>
+          </a:p>
+          <a:p>
+            <a:pPr marL="0" indent="0" algn="l">
+              <a:buNone/>
+            </a:pPr>
+            <a:r>
+              <a:rPr lang="en-US" b="1" i="0" dirty="0">
+                <a:effectLst/>
+                <a:latin typeface="Söhne"/>
+              </a:rPr>
+              <a:t>Youth Engagement and Education</a:t>
+            </a:r>
+            <a:r>
+              <a:rPr lang="en-US" b="0" i="0" dirty="0">
+                <a:effectLst/>
+                <a:latin typeface="Söhne"/>
+              </a:rPr>
+              <a:t>: </a:t>
+            </a:r>
+          </a:p>
+          <a:p>
+            <a:pPr marL="0" indent="0" algn="l">
+              <a:buNone/>
+            </a:pPr>
+            <a:r>
+              <a:rPr lang="en-US" sz="2000" b="0" i="0" dirty="0">
+                <a:effectLst/>
+                <a:latin typeface="Söhne"/>
+              </a:rPr>
+              <a:t>Develop programs that engage young people in positive activities and skill-building to divert them from criminal influences. Invest in quality education and vocational training opportunities to improve future prospects.</a:t>
+            </a:r>
+          </a:p>
+        </p:txBody>
+      </p:sp>
+    </p:spTree>
+    <p:extLst>
+      <p:ext uri="{BB962C8B-B14F-4D97-AF65-F5344CB8AC3E}">
+        <p14:creationId xmlns:p14="http://schemas.microsoft.com/office/powerpoint/2010/main" val="645485776"/>
+      </p:ext>
+    </p:extLst>
+  </p:cSld>
+  <p:clrMapOvr>
+    <a:masterClrMapping/>
+  </p:clrMapOvr>
+</p:sld>
+</file>
+
+<file path=ppt/slides/slide19.xml><?xml version="1.0" encoding="utf-8"?>
+<p:sld xmlns:a="http://schemas.openxmlformats.org/drawingml/2006/main" xmlns:r="http://schemas.openxmlformats.org/officeDocument/2006/relationships" xmlns:p="http://schemas.openxmlformats.org/presentationml/2006/main">
+  <p:cSld>
+    <p:spTree>
+      <p:nvGrpSpPr>
+        <p:cNvPr id="1" name=""/>
+        <p:cNvGrpSpPr/>
+        <p:nvPr/>
+      </p:nvGrpSpPr>
+      <p:grpSpPr>
+        <a:xfrm>
+          <a:off x="0" y="0"/>
+          <a:ext cx="0" cy="0"/>
+          <a:chOff x="0" y="0"/>
+          <a:chExt cx="0" cy="0"/>
+        </a:xfrm>
+      </p:grpSpPr>
+      <p:sp>
+        <p:nvSpPr>
+          <p:cNvPr id="2" name="Title 1">
+            <a:extLst>
+              <a:ext uri="{FF2B5EF4-FFF2-40B4-BE49-F238E27FC236}">
+                <a16:creationId xmlns:a16="http://schemas.microsoft.com/office/drawing/2014/main" id="{F8A587C5-A4E7-DA8A-F86A-F67A9AD6FD04}"/>
+              </a:ext>
+            </a:extLst>
+          </p:cNvPr>
+          <p:cNvSpPr>
+            <a:spLocks noGrp="1"/>
+          </p:cNvSpPr>
+          <p:nvPr>
+            <p:ph type="title"/>
+          </p:nvPr>
+        </p:nvSpPr>
+        <p:spPr>
+          <a:xfrm>
+            <a:off x="838200" y="365125"/>
+            <a:ext cx="7600950" cy="1325563"/>
+          </a:xfrm>
+        </p:spPr>
+        <p:txBody>
+          <a:bodyPr/>
+          <a:lstStyle/>
+          <a:p>
+            <a:r>
+              <a:rPr lang="en-US" dirty="0">
+                <a:latin typeface="Arial Rounded MT Bold" panose="020F0704030504030204" pitchFamily="34" charset="0"/>
+              </a:rPr>
+              <a:t>STRATEGIES AND RECOMMENDATIONS</a:t>
+            </a:r>
+          </a:p>
+        </p:txBody>
+      </p:sp>
+      <p:sp>
+        <p:nvSpPr>
+          <p:cNvPr id="3" name="Content Placeholder 2">
+            <a:extLst>
+              <a:ext uri="{FF2B5EF4-FFF2-40B4-BE49-F238E27FC236}">
+                <a16:creationId xmlns:a16="http://schemas.microsoft.com/office/drawing/2014/main" id="{02B7C7C2-9B70-9F11-2CE2-FEFEC895A18F}"/>
+              </a:ext>
+            </a:extLst>
+          </p:cNvPr>
+          <p:cNvSpPr>
+            <a:spLocks noGrp="1"/>
+          </p:cNvSpPr>
+          <p:nvPr>
+            <p:ph idx="1"/>
+          </p:nvPr>
+        </p:nvSpPr>
+        <p:spPr>
+          <a:xfrm>
+            <a:off x="838200" y="1854200"/>
+            <a:ext cx="10515600" cy="4351338"/>
+          </a:xfrm>
+        </p:spPr>
+        <p:txBody>
+          <a:bodyPr>
+            <a:normAutofit/>
+          </a:bodyPr>
+          <a:lstStyle/>
+          <a:p>
+            <a:pPr marL="0" indent="0" algn="just">
+              <a:buNone/>
+            </a:pPr>
+            <a:endParaRPr lang="en-US" sz="2000" b="0" i="0" dirty="0">
+              <a:effectLst/>
+              <a:latin typeface="Söhne"/>
+            </a:endParaRPr>
+          </a:p>
+          <a:p>
+            <a:pPr marL="0" indent="0" algn="l">
+              <a:buNone/>
+            </a:pPr>
+            <a:r>
+              <a:rPr lang="en-US" b="1" i="0" dirty="0">
+                <a:effectLst/>
+                <a:latin typeface="Söhne"/>
+              </a:rPr>
+              <a:t>Crime Prevention Through Environmental Design (CPTED)</a:t>
+            </a:r>
+            <a:endParaRPr lang="en-US" b="0" i="0" dirty="0">
+              <a:effectLst/>
+              <a:latin typeface="Söhne"/>
+            </a:endParaRPr>
+          </a:p>
+          <a:p>
+            <a:pPr marL="0" indent="0" algn="l">
+              <a:buNone/>
+            </a:pPr>
+            <a:r>
+              <a:rPr lang="en-US" b="0" i="0" dirty="0">
+                <a:effectLst/>
+                <a:latin typeface="Söhne"/>
+              </a:rPr>
+              <a:t> </a:t>
+            </a:r>
+            <a:r>
+              <a:rPr lang="en-US" sz="2000" b="0" i="0" dirty="0">
+                <a:effectLst/>
+                <a:latin typeface="Söhne"/>
+              </a:rPr>
+              <a:t>Design urban spaces with safety in mind, focusing on well-lit streets, clear signage, and well-maintained public areas that discourage criminal activities.</a:t>
+            </a:r>
+          </a:p>
+          <a:p>
+            <a:pPr marL="0" indent="0" algn="l">
+              <a:buNone/>
+            </a:pPr>
+            <a:r>
+              <a:rPr lang="en-US" b="1" i="0" dirty="0">
+                <a:effectLst/>
+                <a:latin typeface="Söhne"/>
+              </a:rPr>
+              <a:t>Social Services and Rehabilitation</a:t>
+            </a:r>
+            <a:r>
+              <a:rPr lang="en-US" b="0" i="0" dirty="0">
+                <a:effectLst/>
+                <a:latin typeface="Söhne"/>
+              </a:rPr>
+              <a:t> </a:t>
+            </a:r>
+          </a:p>
+          <a:p>
+            <a:pPr marL="0" indent="0" algn="l">
+              <a:buNone/>
+            </a:pPr>
+            <a:r>
+              <a:rPr lang="en-US" sz="2000" b="0" i="0" dirty="0">
+                <a:effectLst/>
+                <a:latin typeface="Söhne"/>
+              </a:rPr>
+              <a:t>Establish programs that support individuals at risk of criminal involvement, such as substance abuse counseling, mental health services, and reintegration programs for ex-offenders.</a:t>
+            </a:r>
+          </a:p>
+          <a:p>
+            <a:pPr marL="0" indent="0" algn="l">
+              <a:buNone/>
+            </a:pPr>
+            <a:r>
+              <a:rPr lang="en-US" b="1" i="0" dirty="0">
+                <a:effectLst/>
+                <a:latin typeface="Söhne"/>
+              </a:rPr>
+              <a:t>Strengthening Legal Institutions</a:t>
+            </a:r>
+            <a:endParaRPr lang="en-US" b="0" i="0" dirty="0">
+              <a:effectLst/>
+              <a:latin typeface="Söhne"/>
+            </a:endParaRPr>
+          </a:p>
+          <a:p>
+            <a:pPr marL="0" indent="0" algn="l">
+              <a:buNone/>
+            </a:pPr>
+            <a:r>
+              <a:rPr lang="en-US" b="0" i="0" dirty="0">
+                <a:effectLst/>
+                <a:latin typeface="Söhne"/>
+              </a:rPr>
+              <a:t> </a:t>
+            </a:r>
+            <a:r>
+              <a:rPr lang="en-US" sz="2000" b="0" i="0" dirty="0">
+                <a:effectLst/>
+                <a:latin typeface="Söhne"/>
+              </a:rPr>
+              <a:t>Ensure a swift and fair judicial process by reducing case backlogs, increasing efficiency, and implementing restorative justice practices when appropriate.</a:t>
+            </a:r>
+            <a:endParaRPr lang="en-US" b="0" i="0" dirty="0">
+              <a:effectLst/>
+              <a:latin typeface="Söhne"/>
+            </a:endParaRPr>
+          </a:p>
+        </p:txBody>
+      </p:sp>
+    </p:spTree>
+    <p:extLst>
+      <p:ext uri="{BB962C8B-B14F-4D97-AF65-F5344CB8AC3E}">
+        <p14:creationId xmlns:p14="http://schemas.microsoft.com/office/powerpoint/2010/main" val="1841207613"/>
+      </p:ext>
+    </p:extLst>
+  </p:cSld>
+  <p:clrMapOvr>
+    <a:masterClrMapping/>
+  </p:clrMapOvr>
+</p:sld>
+</file>
+
 <file path=ppt/slides/slide2.xml><?xml version="1.0" encoding="utf-8"?>
 <p:sld xmlns:a="http://schemas.openxmlformats.org/drawingml/2006/main" xmlns:r="http://schemas.openxmlformats.org/officeDocument/2006/relationships" xmlns:p="http://schemas.openxmlformats.org/presentationml/2006/main">
   <p:cSld>
@@ -28154,6 +28573,624 @@
   <p:transition spd="slow">
     <p:push dir="u"/>
   </p:transition>
+</p:sld>
+</file>
+
+<file path=ppt/slides/slide20.xml><?xml version="1.0" encoding="utf-8"?>
+<p:sld xmlns:a="http://schemas.openxmlformats.org/drawingml/2006/main" xmlns:r="http://schemas.openxmlformats.org/officeDocument/2006/relationships" xmlns:p="http://schemas.openxmlformats.org/presentationml/2006/main">
+  <p:cSld>
+    <p:spTree>
+      <p:nvGrpSpPr>
+        <p:cNvPr id="1" name=""/>
+        <p:cNvGrpSpPr/>
+        <p:nvPr/>
+      </p:nvGrpSpPr>
+      <p:grpSpPr>
+        <a:xfrm>
+          <a:off x="0" y="0"/>
+          <a:ext cx="0" cy="0"/>
+          <a:chOff x="0" y="0"/>
+          <a:chExt cx="0" cy="0"/>
+        </a:xfrm>
+      </p:grpSpPr>
+      <p:sp>
+        <p:nvSpPr>
+          <p:cNvPr id="2" name="Title 1">
+            <a:extLst>
+              <a:ext uri="{FF2B5EF4-FFF2-40B4-BE49-F238E27FC236}">
+                <a16:creationId xmlns:a16="http://schemas.microsoft.com/office/drawing/2014/main" id="{F8A587C5-A4E7-DA8A-F86A-F67A9AD6FD04}"/>
+              </a:ext>
+            </a:extLst>
+          </p:cNvPr>
+          <p:cNvSpPr>
+            <a:spLocks noGrp="1"/>
+          </p:cNvSpPr>
+          <p:nvPr>
+            <p:ph type="title"/>
+          </p:nvPr>
+        </p:nvSpPr>
+        <p:spPr>
+          <a:xfrm>
+            <a:off x="838200" y="365125"/>
+            <a:ext cx="7600950" cy="1325563"/>
+          </a:xfrm>
+        </p:spPr>
+        <p:txBody>
+          <a:bodyPr/>
+          <a:lstStyle/>
+          <a:p>
+            <a:r>
+              <a:rPr lang="en-US" dirty="0">
+                <a:latin typeface="Arial Rounded MT Bold" panose="020F0704030504030204" pitchFamily="34" charset="0"/>
+              </a:rPr>
+              <a:t>STRATEGIES AND RECOMMENDATIONS</a:t>
+            </a:r>
+          </a:p>
+        </p:txBody>
+      </p:sp>
+      <p:sp>
+        <p:nvSpPr>
+          <p:cNvPr id="3" name="Content Placeholder 2">
+            <a:extLst>
+              <a:ext uri="{FF2B5EF4-FFF2-40B4-BE49-F238E27FC236}">
+                <a16:creationId xmlns:a16="http://schemas.microsoft.com/office/drawing/2014/main" id="{02B7C7C2-9B70-9F11-2CE2-FEFEC895A18F}"/>
+              </a:ext>
+            </a:extLst>
+          </p:cNvPr>
+          <p:cNvSpPr>
+            <a:spLocks noGrp="1"/>
+          </p:cNvSpPr>
+          <p:nvPr>
+            <p:ph idx="1"/>
+          </p:nvPr>
+        </p:nvSpPr>
+        <p:spPr>
+          <a:xfrm>
+            <a:off x="838200" y="1854200"/>
+            <a:ext cx="10515600" cy="4351338"/>
+          </a:xfrm>
+        </p:spPr>
+        <p:txBody>
+          <a:bodyPr>
+            <a:normAutofit/>
+          </a:bodyPr>
+          <a:lstStyle/>
+          <a:p>
+            <a:pPr marL="0" indent="0" algn="just">
+              <a:buNone/>
+            </a:pPr>
+            <a:endParaRPr lang="en-US" sz="2000" b="0" i="0" dirty="0">
+              <a:effectLst/>
+              <a:latin typeface="Söhne"/>
+            </a:endParaRPr>
+          </a:p>
+          <a:p>
+            <a:pPr marL="0" indent="0" algn="l">
+              <a:buNone/>
+            </a:pPr>
+            <a:r>
+              <a:rPr lang="en-US" b="1" i="0" dirty="0">
+                <a:effectLst/>
+                <a:latin typeface="Söhne"/>
+              </a:rPr>
+              <a:t>Youth Mentorship and Role Models</a:t>
+            </a:r>
+            <a:endParaRPr lang="en-US" b="0" i="0" dirty="0">
+              <a:effectLst/>
+              <a:latin typeface="Söhne"/>
+            </a:endParaRPr>
+          </a:p>
+          <a:p>
+            <a:pPr marL="0" indent="0" algn="l">
+              <a:buNone/>
+            </a:pPr>
+            <a:r>
+              <a:rPr lang="en-US" sz="2000" b="0" i="0" dirty="0">
+                <a:effectLst/>
+                <a:latin typeface="Söhne"/>
+              </a:rPr>
+              <a:t>Foster mentorship programs and provide positive role models for young people, showing them constructive pathways to success.</a:t>
+            </a:r>
+            <a:endParaRPr lang="en-US" b="0" i="0" dirty="0">
+              <a:effectLst/>
+              <a:latin typeface="Söhne"/>
+            </a:endParaRPr>
+          </a:p>
+          <a:p>
+            <a:pPr marL="0" indent="0" algn="l">
+              <a:buNone/>
+            </a:pPr>
+            <a:r>
+              <a:rPr lang="en-US" b="1" i="0" dirty="0">
+                <a:effectLst/>
+                <a:latin typeface="Söhne"/>
+              </a:rPr>
+              <a:t>Public Awareness Campaigns</a:t>
+            </a:r>
+            <a:r>
+              <a:rPr lang="en-US" b="0" i="0" dirty="0">
+                <a:effectLst/>
+                <a:latin typeface="Söhne"/>
+              </a:rPr>
+              <a:t> </a:t>
+            </a:r>
+          </a:p>
+          <a:p>
+            <a:pPr marL="0" indent="0" algn="l">
+              <a:buNone/>
+            </a:pPr>
+            <a:r>
+              <a:rPr lang="en-US" sz="2000" b="0" i="0" dirty="0">
+                <a:effectLst/>
+                <a:latin typeface="Söhne"/>
+              </a:rPr>
+              <a:t>Run campaigns that raise awareness about crime prevention, safety measures, and citizens' responsibilities in maintaining a secure environment.</a:t>
+            </a:r>
+          </a:p>
+          <a:p>
+            <a:pPr marL="0" indent="0" algn="l">
+              <a:buNone/>
+            </a:pPr>
+            <a:r>
+              <a:rPr lang="en-US" b="1" i="0" dirty="0">
+                <a:effectLst/>
+                <a:latin typeface="Söhne"/>
+              </a:rPr>
+              <a:t>Technology for Safety</a:t>
+            </a:r>
+            <a:r>
+              <a:rPr lang="en-US" b="0" i="0" dirty="0">
+                <a:effectLst/>
+                <a:latin typeface="Söhne"/>
+              </a:rPr>
+              <a:t> </a:t>
+            </a:r>
+          </a:p>
+          <a:p>
+            <a:pPr marL="0" indent="0" algn="l">
+              <a:buNone/>
+            </a:pPr>
+            <a:r>
+              <a:rPr lang="en-US" sz="2000" b="0" i="0" dirty="0">
+                <a:effectLst/>
+                <a:latin typeface="Söhne"/>
+              </a:rPr>
+              <a:t>Utilize technology, such as surveillance cameras, crime reporting apps, and emergency helplines, to empower citizens to report crimes and emergencies promptly</a:t>
+            </a:r>
+            <a:r>
+              <a:rPr lang="en-US" b="0" i="0" dirty="0">
+                <a:effectLst/>
+                <a:latin typeface="Söhne"/>
+              </a:rPr>
+              <a:t>.</a:t>
+            </a:r>
+          </a:p>
+        </p:txBody>
+      </p:sp>
+    </p:spTree>
+    <p:extLst>
+      <p:ext uri="{BB962C8B-B14F-4D97-AF65-F5344CB8AC3E}">
+        <p14:creationId xmlns:p14="http://schemas.microsoft.com/office/powerpoint/2010/main" val="4156019485"/>
+      </p:ext>
+    </p:extLst>
+  </p:cSld>
+  <p:clrMapOvr>
+    <a:masterClrMapping/>
+  </p:clrMapOvr>
+</p:sld>
+</file>
+
+<file path=ppt/slides/slide21.xml><?xml version="1.0" encoding="utf-8"?>
+<p:sld xmlns:a="http://schemas.openxmlformats.org/drawingml/2006/main" xmlns:r="http://schemas.openxmlformats.org/officeDocument/2006/relationships" xmlns:p="http://schemas.openxmlformats.org/presentationml/2006/main">
+  <p:cSld>
+    <p:spTree>
+      <p:nvGrpSpPr>
+        <p:cNvPr id="1" name=""/>
+        <p:cNvGrpSpPr/>
+        <p:nvPr/>
+      </p:nvGrpSpPr>
+      <p:grpSpPr>
+        <a:xfrm>
+          <a:off x="0" y="0"/>
+          <a:ext cx="0" cy="0"/>
+          <a:chOff x="0" y="0"/>
+          <a:chExt cx="0" cy="0"/>
+        </a:xfrm>
+      </p:grpSpPr>
+      <p:sp>
+        <p:nvSpPr>
+          <p:cNvPr id="2" name="Title 1">
+            <a:extLst>
+              <a:ext uri="{FF2B5EF4-FFF2-40B4-BE49-F238E27FC236}">
+                <a16:creationId xmlns:a16="http://schemas.microsoft.com/office/drawing/2014/main" id="{F8A587C5-A4E7-DA8A-F86A-F67A9AD6FD04}"/>
+              </a:ext>
+            </a:extLst>
+          </p:cNvPr>
+          <p:cNvSpPr>
+            <a:spLocks noGrp="1"/>
+          </p:cNvSpPr>
+          <p:nvPr>
+            <p:ph type="title"/>
+          </p:nvPr>
+        </p:nvSpPr>
+        <p:spPr>
+          <a:xfrm>
+            <a:off x="838200" y="365125"/>
+            <a:ext cx="7600950" cy="1325563"/>
+          </a:xfrm>
+        </p:spPr>
+        <p:txBody>
+          <a:bodyPr/>
+          <a:lstStyle/>
+          <a:p>
+            <a:r>
+              <a:rPr lang="en-US" dirty="0">
+                <a:latin typeface="Arial Rounded MT Bold" panose="020F0704030504030204" pitchFamily="34" charset="0"/>
+              </a:rPr>
+              <a:t>STRATEGIES AND RECOMMENDATIONS</a:t>
+            </a:r>
+          </a:p>
+        </p:txBody>
+      </p:sp>
+      <p:sp>
+        <p:nvSpPr>
+          <p:cNvPr id="3" name="Content Placeholder 2">
+            <a:extLst>
+              <a:ext uri="{FF2B5EF4-FFF2-40B4-BE49-F238E27FC236}">
+                <a16:creationId xmlns:a16="http://schemas.microsoft.com/office/drawing/2014/main" id="{02B7C7C2-9B70-9F11-2CE2-FEFEC895A18F}"/>
+              </a:ext>
+            </a:extLst>
+          </p:cNvPr>
+          <p:cNvSpPr>
+            <a:spLocks noGrp="1"/>
+          </p:cNvSpPr>
+          <p:nvPr>
+            <p:ph idx="1"/>
+          </p:nvPr>
+        </p:nvSpPr>
+        <p:spPr>
+          <a:xfrm>
+            <a:off x="838200" y="1854200"/>
+            <a:ext cx="10515600" cy="4351338"/>
+          </a:xfrm>
+        </p:spPr>
+        <p:txBody>
+          <a:bodyPr>
+            <a:normAutofit fontScale="92500" lnSpcReduction="10000"/>
+          </a:bodyPr>
+          <a:lstStyle/>
+          <a:p>
+            <a:pPr marL="0" indent="0" algn="l">
+              <a:buNone/>
+            </a:pPr>
+            <a:r>
+              <a:rPr lang="en-US" b="1" i="0" dirty="0">
+                <a:effectLst/>
+                <a:latin typeface="Söhne"/>
+              </a:rPr>
+              <a:t>Strengthening Urban Planning</a:t>
+            </a:r>
+            <a:r>
+              <a:rPr lang="en-US" b="0" i="0" dirty="0">
+                <a:effectLst/>
+                <a:latin typeface="Söhne"/>
+              </a:rPr>
+              <a:t> </a:t>
+            </a:r>
+          </a:p>
+          <a:p>
+            <a:pPr marL="0" indent="0" algn="l">
+              <a:buNone/>
+            </a:pPr>
+            <a:r>
+              <a:rPr lang="en-US" sz="2000" b="0" i="0" dirty="0">
+                <a:effectLst/>
+                <a:latin typeface="Söhne"/>
+              </a:rPr>
+              <a:t>Collaborate with urban planners to create safe, walkable neighborhoods that discourage criminal activities by promoting community interaction.</a:t>
+            </a:r>
+          </a:p>
+          <a:p>
+            <a:pPr marL="0" indent="0" algn="l">
+              <a:buNone/>
+            </a:pPr>
+            <a:r>
+              <a:rPr lang="en-US" b="1" i="0" dirty="0">
+                <a:effectLst/>
+                <a:latin typeface="Söhne"/>
+              </a:rPr>
+              <a:t>Addressing Socio-Economic Disparities</a:t>
+            </a:r>
+            <a:endParaRPr lang="en-US" b="0" i="0" dirty="0">
+              <a:effectLst/>
+              <a:latin typeface="Söhne"/>
+            </a:endParaRPr>
+          </a:p>
+          <a:p>
+            <a:pPr marL="0" indent="0" algn="l">
+              <a:buNone/>
+            </a:pPr>
+            <a:r>
+              <a:rPr lang="en-US" sz="2000" b="0" i="0" dirty="0">
+                <a:effectLst/>
+                <a:latin typeface="Söhne"/>
+              </a:rPr>
+              <a:t>Work on reducing poverty and inequality through social and economic development programs, as these factors can contribute to crime.</a:t>
+            </a:r>
+          </a:p>
+          <a:p>
+            <a:pPr marL="0" indent="0" algn="l">
+              <a:buNone/>
+            </a:pPr>
+            <a:r>
+              <a:rPr lang="en-US" b="1" i="0" dirty="0">
+                <a:effectLst/>
+                <a:latin typeface="Söhne"/>
+              </a:rPr>
+              <a:t>Anti-Corruption Measures</a:t>
+            </a:r>
+            <a:r>
+              <a:rPr lang="en-US" b="0" i="0" dirty="0">
+                <a:effectLst/>
+                <a:latin typeface="Söhne"/>
+              </a:rPr>
+              <a:t>:</a:t>
+            </a:r>
+          </a:p>
+          <a:p>
+            <a:pPr marL="0" indent="0" algn="l">
+              <a:buNone/>
+            </a:pPr>
+            <a:r>
+              <a:rPr lang="en-US" sz="2000" b="0" i="0" dirty="0">
+                <a:effectLst/>
+                <a:latin typeface="Söhne"/>
+              </a:rPr>
+              <a:t>Implement measures to reduce corruption within law enforcement and other government institutions, ensuring that resources are allocated fairly and transparently</a:t>
+            </a:r>
+            <a:r>
+              <a:rPr lang="en-US" b="0" i="0" dirty="0">
+                <a:effectLst/>
+                <a:latin typeface="Söhne"/>
+              </a:rPr>
+              <a:t>.</a:t>
+            </a:r>
+          </a:p>
+          <a:p>
+            <a:pPr marL="0" indent="0" algn="l">
+              <a:buNone/>
+            </a:pPr>
+            <a:r>
+              <a:rPr lang="en-US" b="1" i="0" dirty="0">
+                <a:effectLst/>
+                <a:latin typeface="Söhne"/>
+              </a:rPr>
+              <a:t>Public-Private Partnerships</a:t>
+            </a:r>
+            <a:r>
+              <a:rPr lang="en-US" b="0" i="0" dirty="0">
+                <a:effectLst/>
+                <a:latin typeface="Söhne"/>
+              </a:rPr>
+              <a:t> </a:t>
+            </a:r>
+          </a:p>
+          <a:p>
+            <a:pPr marL="0" indent="0" algn="l">
+              <a:buNone/>
+            </a:pPr>
+            <a:r>
+              <a:rPr lang="en-US" sz="2000" b="0" i="0" dirty="0">
+                <a:effectLst/>
+                <a:latin typeface="Söhne"/>
+              </a:rPr>
+              <a:t>Collaborate with businesses and private sector entities to support crime prevention initiatives, including funding for community programs and security measures.</a:t>
+            </a:r>
+          </a:p>
+          <a:p>
+            <a:pPr marL="0" indent="0" algn="l">
+              <a:buNone/>
+            </a:pPr>
+            <a:endParaRPr lang="en-US" b="0" i="0" dirty="0">
+              <a:effectLst/>
+              <a:latin typeface="Söhne"/>
+            </a:endParaRPr>
+          </a:p>
+        </p:txBody>
+      </p:sp>
+    </p:spTree>
+    <p:extLst>
+      <p:ext uri="{BB962C8B-B14F-4D97-AF65-F5344CB8AC3E}">
+        <p14:creationId xmlns:p14="http://schemas.microsoft.com/office/powerpoint/2010/main" val="2183602906"/>
+      </p:ext>
+    </p:extLst>
+  </p:cSld>
+  <p:clrMapOvr>
+    <a:masterClrMapping/>
+  </p:clrMapOvr>
+</p:sld>
+</file>
+
+<file path=ppt/slides/slide22.xml><?xml version="1.0" encoding="utf-8"?>
+<p:sld xmlns:a="http://schemas.openxmlformats.org/drawingml/2006/main" xmlns:r="http://schemas.openxmlformats.org/officeDocument/2006/relationships" xmlns:p="http://schemas.openxmlformats.org/presentationml/2006/main">
+  <p:cSld>
+    <p:spTree>
+      <p:nvGrpSpPr>
+        <p:cNvPr id="1" name=""/>
+        <p:cNvGrpSpPr/>
+        <p:nvPr/>
+      </p:nvGrpSpPr>
+      <p:grpSpPr>
+        <a:xfrm>
+          <a:off x="0" y="0"/>
+          <a:ext cx="0" cy="0"/>
+          <a:chOff x="0" y="0"/>
+          <a:chExt cx="0" cy="0"/>
+        </a:xfrm>
+      </p:grpSpPr>
+      <p:sp>
+        <p:nvSpPr>
+          <p:cNvPr id="2" name="Title 1">
+            <a:extLst>
+              <a:ext uri="{FF2B5EF4-FFF2-40B4-BE49-F238E27FC236}">
+                <a16:creationId xmlns:a16="http://schemas.microsoft.com/office/drawing/2014/main" id="{F8A587C5-A4E7-DA8A-F86A-F67A9AD6FD04}"/>
+              </a:ext>
+            </a:extLst>
+          </p:cNvPr>
+          <p:cNvSpPr>
+            <a:spLocks noGrp="1"/>
+          </p:cNvSpPr>
+          <p:nvPr>
+            <p:ph type="title"/>
+          </p:nvPr>
+        </p:nvSpPr>
+        <p:spPr>
+          <a:xfrm>
+            <a:off x="838200" y="365125"/>
+            <a:ext cx="7600950" cy="1325563"/>
+          </a:xfrm>
+        </p:spPr>
+        <p:txBody>
+          <a:bodyPr/>
+          <a:lstStyle/>
+          <a:p>
+            <a:r>
+              <a:rPr lang="en-US" dirty="0">
+                <a:latin typeface="Arial Rounded MT Bold" panose="020F0704030504030204" pitchFamily="34" charset="0"/>
+              </a:rPr>
+              <a:t>STRATEGIES AND RECOMMENDATIONS</a:t>
+            </a:r>
+          </a:p>
+        </p:txBody>
+      </p:sp>
+      <p:sp>
+        <p:nvSpPr>
+          <p:cNvPr id="3" name="Content Placeholder 2">
+            <a:extLst>
+              <a:ext uri="{FF2B5EF4-FFF2-40B4-BE49-F238E27FC236}">
+                <a16:creationId xmlns:a16="http://schemas.microsoft.com/office/drawing/2014/main" id="{02B7C7C2-9B70-9F11-2CE2-FEFEC895A18F}"/>
+              </a:ext>
+            </a:extLst>
+          </p:cNvPr>
+          <p:cNvSpPr>
+            <a:spLocks noGrp="1"/>
+          </p:cNvSpPr>
+          <p:nvPr>
+            <p:ph idx="1"/>
+          </p:nvPr>
+        </p:nvSpPr>
+        <p:spPr>
+          <a:xfrm>
+            <a:off x="838200" y="1854200"/>
+            <a:ext cx="10515600" cy="4351338"/>
+          </a:xfrm>
+        </p:spPr>
+        <p:txBody>
+          <a:bodyPr>
+            <a:normAutofit/>
+          </a:bodyPr>
+          <a:lstStyle/>
+          <a:p>
+            <a:pPr marL="0" indent="0" algn="l">
+              <a:buNone/>
+            </a:pPr>
+            <a:r>
+              <a:rPr lang="en-US" b="1" i="0" dirty="0">
+                <a:effectLst/>
+                <a:latin typeface="Söhne"/>
+              </a:rPr>
+              <a:t>Data-Driven Strategies</a:t>
+            </a:r>
+            <a:r>
+              <a:rPr lang="en-US" b="0" i="0" dirty="0">
+                <a:effectLst/>
+                <a:latin typeface="Söhne"/>
+              </a:rPr>
+              <a:t> </a:t>
+            </a:r>
+          </a:p>
+          <a:p>
+            <a:pPr marL="0" indent="0" algn="l">
+              <a:buNone/>
+            </a:pPr>
+            <a:r>
+              <a:rPr lang="en-US" sz="2000" b="0" i="0" dirty="0">
+                <a:effectLst/>
+                <a:latin typeface="Söhne"/>
+              </a:rPr>
+              <a:t>Utilize data to identify crime trends, hotspots, and high-risk areas. This information can guide resource allocation and targeted interventions</a:t>
+            </a:r>
+            <a:r>
+              <a:rPr lang="en-US" b="0" i="0" dirty="0">
+                <a:effectLst/>
+                <a:latin typeface="Söhne"/>
+              </a:rPr>
+              <a:t>.</a:t>
+            </a:r>
+          </a:p>
+          <a:p>
+            <a:pPr marL="0" indent="0" algn="l">
+              <a:buNone/>
+            </a:pPr>
+            <a:r>
+              <a:rPr lang="en-US" b="1" i="0" dirty="0">
+                <a:effectLst/>
+                <a:latin typeface="Söhne"/>
+              </a:rPr>
+              <a:t>Regular Evaluation </a:t>
+            </a:r>
+            <a:r>
+              <a:rPr lang="en-US" b="1" i="0">
+                <a:effectLst/>
+                <a:latin typeface="Söhne"/>
+              </a:rPr>
+              <a:t>and Adaptation</a:t>
+            </a:r>
+            <a:r>
+              <a:rPr lang="en-US" b="0" i="0">
+                <a:effectLst/>
+                <a:latin typeface="Söhne"/>
+              </a:rPr>
+              <a:t> </a:t>
+            </a:r>
+            <a:endParaRPr lang="en-US" b="0" i="0" dirty="0">
+              <a:effectLst/>
+              <a:latin typeface="Söhne"/>
+            </a:endParaRPr>
+          </a:p>
+          <a:p>
+            <a:pPr marL="0" indent="0" algn="l">
+              <a:buNone/>
+            </a:pPr>
+            <a:r>
+              <a:rPr lang="en-US" sz="2000" b="0" i="0" dirty="0">
+                <a:effectLst/>
+                <a:latin typeface="Söhne"/>
+              </a:rPr>
+              <a:t>Continuously assess the effectiveness of crime prevention strategies, adjust approaches based on feedback, and remain open to innovation and new ideas.</a:t>
+            </a:r>
+          </a:p>
+          <a:p>
+            <a:pPr marL="0" indent="0" algn="l">
+              <a:buNone/>
+            </a:pPr>
+            <a:endParaRPr lang="en-US" b="0" i="0" dirty="0">
+              <a:effectLst/>
+              <a:latin typeface="Söhne"/>
+            </a:endParaRPr>
+          </a:p>
+        </p:txBody>
+      </p:sp>
+    </p:spTree>
+    <p:extLst>
+      <p:ext uri="{BB962C8B-B14F-4D97-AF65-F5344CB8AC3E}">
+        <p14:creationId xmlns:p14="http://schemas.microsoft.com/office/powerpoint/2010/main" val="4291236698"/>
+      </p:ext>
+    </p:extLst>
+  </p:cSld>
+  <p:clrMapOvr>
+    <a:masterClrMapping/>
+  </p:clrMapOvr>
 </p:sld>
 </file>
 

</xml_diff>

<commit_message>
added crime & good governance slide
</commit_message>
<xml_diff>
--- a/BGS/FINAL PRESENTATION/CRIME IN DHAKA CITY.pptx
+++ b/BGS/FINAL PRESENTATION/CRIME IN DHAKA CITY.pptx
@@ -5,7 +5,7 @@
     <p:sldMasterId id="2147483801" r:id="rId1"/>
   </p:sldMasterIdLst>
   <p:notesMasterIdLst>
-    <p:notesMasterId r:id="rId24"/>
+    <p:notesMasterId r:id="rId26"/>
   </p:notesMasterIdLst>
   <p:sldIdLst>
     <p:sldId id="256" r:id="rId2"/>
@@ -25,11 +25,13 @@
     <p:sldId id="271" r:id="rId16"/>
     <p:sldId id="272" r:id="rId17"/>
     <p:sldId id="273" r:id="rId18"/>
-    <p:sldId id="274" r:id="rId19"/>
-    <p:sldId id="275" r:id="rId20"/>
-    <p:sldId id="276" r:id="rId21"/>
-    <p:sldId id="277" r:id="rId22"/>
-    <p:sldId id="278" r:id="rId23"/>
+    <p:sldId id="279" r:id="rId19"/>
+    <p:sldId id="280" r:id="rId20"/>
+    <p:sldId id="274" r:id="rId21"/>
+    <p:sldId id="275" r:id="rId22"/>
+    <p:sldId id="276" r:id="rId23"/>
+    <p:sldId id="277" r:id="rId24"/>
+    <p:sldId id="278" r:id="rId25"/>
   </p:sldIdLst>
   <p:sldSz cx="12192000" cy="6858000"/>
   <p:notesSz cx="6858000" cy="9144000"/>
@@ -27847,7 +27849,7 @@
           <p:cNvPr id="2" name="Title 1">
             <a:extLst>
               <a:ext uri="{FF2B5EF4-FFF2-40B4-BE49-F238E27FC236}">
-                <a16:creationId xmlns:a16="http://schemas.microsoft.com/office/drawing/2014/main" id="{F8A587C5-A4E7-DA8A-F86A-F67A9AD6FD04}"/>
+                <a16:creationId xmlns:a16="http://schemas.microsoft.com/office/drawing/2014/main" id="{FBF3BB72-DCA1-1F3B-DEED-611193B69E89}"/>
               </a:ext>
             </a:extLst>
           </p:cNvPr>
@@ -27858,12 +27860,7 @@
             <p:ph type="title"/>
           </p:nvPr>
         </p:nvSpPr>
-        <p:spPr>
-          <a:xfrm>
-            <a:off x="838200" y="365125"/>
-            <a:ext cx="7600950" cy="1325563"/>
-          </a:xfrm>
-        </p:spPr>
+        <p:spPr/>
         <p:txBody>
           <a:bodyPr/>
           <a:lstStyle/>
@@ -27872,7 +27869,7 @@
               <a:rPr lang="en-US" dirty="0">
                 <a:latin typeface="Arial Rounded MT Bold" panose="020F0704030504030204" pitchFamily="34" charset="0"/>
               </a:rPr>
-              <a:t>STRATEGIES AND RECOMMENDATIONS</a:t>
+              <a:t>CRIME AND GOOD GOVERNANCE</a:t>
             </a:r>
           </a:p>
         </p:txBody>
@@ -27882,7 +27879,7 @@
           <p:cNvPr id="3" name="Content Placeholder 2">
             <a:extLst>
               <a:ext uri="{FF2B5EF4-FFF2-40B4-BE49-F238E27FC236}">
-                <a16:creationId xmlns:a16="http://schemas.microsoft.com/office/drawing/2014/main" id="{02B7C7C2-9B70-9F11-2CE2-FEFEC895A18F}"/>
+                <a16:creationId xmlns:a16="http://schemas.microsoft.com/office/drawing/2014/main" id="{C174C119-3AC7-F3E0-C4BB-383EBFCA98EB}"/>
               </a:ext>
             </a:extLst>
           </p:cNvPr>
@@ -27893,135 +27890,31 @@
             <p:ph idx="1"/>
           </p:nvPr>
         </p:nvSpPr>
-        <p:spPr>
-          <a:xfrm>
-            <a:off x="838200" y="1854200"/>
-            <a:ext cx="10515600" cy="4351338"/>
-          </a:xfrm>
-        </p:spPr>
+        <p:spPr/>
         <p:txBody>
           <a:bodyPr>
             <a:normAutofit lnSpcReduction="10000"/>
           </a:bodyPr>
           <a:lstStyle/>
           <a:p>
-            <a:pPr marL="0" indent="0" algn="just">
+            <a:pPr marL="0" indent="0">
               <a:buNone/>
             </a:pPr>
-            <a:endParaRPr lang="en-US" sz="2000" b="0" i="0" dirty="0">
-              <a:effectLst/>
-              <a:latin typeface="Söhne"/>
-            </a:endParaRPr>
-          </a:p>
-          <a:p>
-            <a:pPr marL="0" indent="0" algn="l">
-              <a:buNone/>
-            </a:pPr>
-            <a:r>
-              <a:rPr lang="en-US" b="1" i="0" dirty="0">
-                <a:effectLst/>
-                <a:latin typeface="Söhne"/>
-              </a:rPr>
-              <a:t>Community Policing and Engagement</a:t>
-            </a:r>
             <a:r>
               <a:rPr lang="en-US" b="0" i="0" dirty="0">
                 <a:effectLst/>
                 <a:latin typeface="Söhne"/>
               </a:rPr>
-              <a:t>: </a:t>
+              <a:t>The link between crime and good governance is profound, as effective governance plays a crucial role in preventing and addressing criminal activities. Good governance, characterized by transparency, accountability, strong institutions, and the rule of law, establishes a framework that discourages criminal behavior by ensuring fair and just systems. It enables law enforcement agencies to operate efficiently, promotes the swift delivery of justice, and fosters an environment where citizens trust institutions. When governance is weak or corrupt, criminals can exploit loopholes, evade justice, and manipulate systems, leading to higher crime rates, eroded public trust, and social unrest. Thus, the strength of governance significantly influences a society's ability to manage and reduce crime effectively.</a:t>
             </a:r>
-          </a:p>
-          <a:p>
-            <a:pPr marL="0" indent="0" algn="l">
-              <a:buNone/>
-            </a:pPr>
-            <a:r>
-              <a:rPr lang="en-US" sz="2000" b="0" i="0" dirty="0">
-                <a:effectLst/>
-                <a:latin typeface="Söhne"/>
-              </a:rPr>
-              <a:t>Establish strong community-police partnerships to foster trust and collaboration. Encourage police officers to interact positively with residents, understand local concerns, and work together to address issues.</a:t>
-            </a:r>
-            <a:endParaRPr lang="en-US" sz="1400" b="0" i="0" dirty="0">
-              <a:effectLst/>
-              <a:latin typeface="Söhne"/>
-            </a:endParaRPr>
-          </a:p>
-          <a:p>
-            <a:pPr marL="0" indent="0" algn="l">
-              <a:buNone/>
-            </a:pPr>
-            <a:r>
-              <a:rPr lang="en-US" b="1" i="0" dirty="0">
-                <a:effectLst/>
-                <a:latin typeface="Söhne"/>
-              </a:rPr>
-              <a:t>Enhanced Law Enforcement</a:t>
-            </a:r>
-            <a:r>
-              <a:rPr lang="en-US" b="0" i="0" dirty="0">
-                <a:effectLst/>
-                <a:latin typeface="Söhne"/>
-              </a:rPr>
-              <a:t>: I</a:t>
-            </a:r>
-          </a:p>
-          <a:p>
-            <a:pPr marL="0" indent="0" algn="l">
-              <a:buNone/>
-            </a:pPr>
-            <a:r>
-              <a:rPr lang="en-US" sz="2000" dirty="0">
-                <a:latin typeface="Söhne"/>
-              </a:rPr>
-              <a:t>Increase</a:t>
-            </a:r>
-            <a:r>
-              <a:rPr lang="en-US" sz="2000" b="0" i="0" dirty="0">
-                <a:effectLst/>
-                <a:latin typeface="Söhne"/>
-              </a:rPr>
-              <a:t> police presence in high-crime areas and implement effective patrolling strategies. Modernize the police force with technology, surveillance, and data-driven crime analysis to better allocate resources.</a:t>
-            </a:r>
-          </a:p>
-          <a:p>
-            <a:pPr marL="0" indent="0" algn="l">
-              <a:buNone/>
-            </a:pPr>
-            <a:r>
-              <a:rPr lang="en-US" b="1" i="0" dirty="0">
-                <a:effectLst/>
-                <a:latin typeface="Söhne"/>
-              </a:rPr>
-              <a:t>Youth Engagement and Education</a:t>
-            </a:r>
-            <a:r>
-              <a:rPr lang="en-US" b="0" i="0" dirty="0">
-                <a:effectLst/>
-                <a:latin typeface="Söhne"/>
-              </a:rPr>
-              <a:t>: </a:t>
-            </a:r>
-          </a:p>
-          <a:p>
-            <a:pPr marL="0" indent="0" algn="l">
-              <a:buNone/>
-            </a:pPr>
-            <a:r>
-              <a:rPr lang="en-US" sz="2000" b="0" i="0" dirty="0">
-                <a:effectLst/>
-                <a:latin typeface="Söhne"/>
-              </a:rPr>
-              <a:t>Develop programs that engage young people in positive activities and skill-building to divert them from criminal influences. Invest in quality education and vocational training opportunities to improve future prospects.</a:t>
-            </a:r>
+            <a:endParaRPr lang="en-US" dirty="0"/>
           </a:p>
         </p:txBody>
       </p:sp>
     </p:spTree>
     <p:extLst>
       <p:ext uri="{BB962C8B-B14F-4D97-AF65-F5344CB8AC3E}">
-        <p14:creationId xmlns:p14="http://schemas.microsoft.com/office/powerpoint/2010/main" val="645485776"/>
+        <p14:creationId xmlns:p14="http://schemas.microsoft.com/office/powerpoint/2010/main" val="1968565782"/>
       </p:ext>
     </p:extLst>
   </p:cSld>
@@ -28053,7 +27946,7 @@
           <p:cNvPr id="2" name="Title 1">
             <a:extLst>
               <a:ext uri="{FF2B5EF4-FFF2-40B4-BE49-F238E27FC236}">
-                <a16:creationId xmlns:a16="http://schemas.microsoft.com/office/drawing/2014/main" id="{F8A587C5-A4E7-DA8A-F86A-F67A9AD6FD04}"/>
+                <a16:creationId xmlns:a16="http://schemas.microsoft.com/office/drawing/2014/main" id="{FBF3BB72-DCA1-1F3B-DEED-611193B69E89}"/>
               </a:ext>
             </a:extLst>
           </p:cNvPr>
@@ -28064,12 +27957,7 @@
             <p:ph type="title"/>
           </p:nvPr>
         </p:nvSpPr>
-        <p:spPr>
-          <a:xfrm>
-            <a:off x="838200" y="365125"/>
-            <a:ext cx="7600950" cy="1325563"/>
-          </a:xfrm>
-        </p:spPr>
+        <p:spPr/>
         <p:txBody>
           <a:bodyPr/>
           <a:lstStyle/>
@@ -28078,7 +27966,7 @@
               <a:rPr lang="en-US" dirty="0">
                 <a:latin typeface="Arial Rounded MT Bold" panose="020F0704030504030204" pitchFamily="34" charset="0"/>
               </a:rPr>
-              <a:t>STRATEGIES AND RECOMMENDATIONS</a:t>
+              <a:t>CRIME AND GOOD GOVERNANCE</a:t>
             </a:r>
           </a:p>
         </p:txBody>
@@ -28088,7 +27976,7 @@
           <p:cNvPr id="3" name="Content Placeholder 2">
             <a:extLst>
               <a:ext uri="{FF2B5EF4-FFF2-40B4-BE49-F238E27FC236}">
-                <a16:creationId xmlns:a16="http://schemas.microsoft.com/office/drawing/2014/main" id="{02B7C7C2-9B70-9F11-2CE2-FEFEC895A18F}"/>
+                <a16:creationId xmlns:a16="http://schemas.microsoft.com/office/drawing/2014/main" id="{C174C119-3AC7-F3E0-C4BB-383EBFCA98EB}"/>
               </a:ext>
             </a:extLst>
           </p:cNvPr>
@@ -28099,44 +27987,14 @@
             <p:ph idx="1"/>
           </p:nvPr>
         </p:nvSpPr>
-        <p:spPr>
-          <a:xfrm>
-            <a:off x="838200" y="1854200"/>
-            <a:ext cx="10515600" cy="4351338"/>
-          </a:xfrm>
-        </p:spPr>
+        <p:spPr/>
         <p:txBody>
           <a:bodyPr>
-            <a:normAutofit/>
+            <a:normAutofit lnSpcReduction="10000"/>
           </a:bodyPr>
           <a:lstStyle/>
           <a:p>
-            <a:pPr marL="0" indent="0" algn="just">
-              <a:buNone/>
-            </a:pPr>
-            <a:endParaRPr lang="en-US" sz="2000" b="0" i="0" dirty="0">
-              <a:effectLst/>
-              <a:latin typeface="Söhne"/>
-            </a:endParaRPr>
-          </a:p>
-          <a:p>
-            <a:pPr marL="0" indent="0" algn="l">
-              <a:buNone/>
-            </a:pPr>
-            <a:r>
-              <a:rPr lang="en-US" b="1" i="0" dirty="0">
-                <a:effectLst/>
-                <a:latin typeface="Söhne"/>
-              </a:rPr>
-              <a:t>Crime Prevention Through Environmental Design (CPTED)</a:t>
-            </a:r>
-            <a:endParaRPr lang="en-US" b="0" i="0" dirty="0">
-              <a:effectLst/>
-              <a:latin typeface="Söhne"/>
-            </a:endParaRPr>
-          </a:p>
-          <a:p>
-            <a:pPr marL="0" indent="0" algn="l">
+            <a:pPr marL="0" indent="0">
               <a:buNone/>
             </a:pPr>
             <a:r>
@@ -28144,92 +28002,16 @@
                 <a:effectLst/>
                 <a:latin typeface="Söhne"/>
               </a:rPr>
-              <a:t> </a:t>
+              <a:t>good governance contributes to crime prevention through socio-economic development and the provision of basic services. When governments prioritize education, healthcare, employment opportunities, and social welfare programs, they address some of the underlying factors that can lead to criminal behavior, such as poverty and desperation. Transparent and accountable governance also helps in curbing corruption, which can be a driving force behind various criminal activities. Furthermore, collaboration between law enforcement agencies, judiciary, and other government bodies is essential for effective crime control. Overall, a well-governed society creates an environment that discourages criminal behavior while promoting the well-being and security of its citizens</a:t>
             </a:r>
-            <a:r>
-              <a:rPr lang="en-US" sz="2000" b="0" i="0" dirty="0">
-                <a:effectLst/>
-                <a:latin typeface="Söhne"/>
-              </a:rPr>
-              <a:t>Design urban spaces with safety in mind, focusing on well-lit streets, clear signage, and well-maintained public areas that discourage criminal activities.</a:t>
-            </a:r>
-          </a:p>
-          <a:p>
-            <a:pPr marL="0" indent="0" algn="l">
-              <a:buNone/>
-            </a:pPr>
-            <a:r>
-              <a:rPr lang="en-US" b="1" i="0" dirty="0">
-                <a:effectLst/>
-                <a:latin typeface="Söhne"/>
-              </a:rPr>
-              <a:t>Social Services and Rehabilitation</a:t>
-            </a:r>
-            <a:r>
-              <a:rPr lang="en-US" b="0" i="0" dirty="0">
-                <a:effectLst/>
-                <a:latin typeface="Söhne"/>
-              </a:rPr>
-              <a:t> </a:t>
-            </a:r>
-          </a:p>
-          <a:p>
-            <a:pPr marL="0" indent="0" algn="l">
-              <a:buNone/>
-            </a:pPr>
-            <a:r>
-              <a:rPr lang="en-US" sz="2000" b="0" i="0" dirty="0">
-                <a:effectLst/>
-                <a:latin typeface="Söhne"/>
-              </a:rPr>
-              <a:t>Establish programs that support individuals at risk of criminal involvement, such as substance abuse counseling, mental health services, and reintegration programs for ex-offenders.</a:t>
-            </a:r>
-          </a:p>
-          <a:p>
-            <a:pPr marL="0" indent="0" algn="l">
-              <a:buNone/>
-            </a:pPr>
-            <a:r>
-              <a:rPr lang="en-US" b="1" i="0" dirty="0">
-                <a:effectLst/>
-                <a:latin typeface="Söhne"/>
-              </a:rPr>
-              <a:t>Strengthening Legal Institutions</a:t>
-            </a:r>
-            <a:endParaRPr lang="en-US" b="0" i="0" dirty="0">
-              <a:effectLst/>
-              <a:latin typeface="Söhne"/>
-            </a:endParaRPr>
-          </a:p>
-          <a:p>
-            <a:pPr marL="0" indent="0" algn="l">
-              <a:buNone/>
-            </a:pPr>
-            <a:r>
-              <a:rPr lang="en-US" b="0" i="0" dirty="0">
-                <a:effectLst/>
-                <a:latin typeface="Söhne"/>
-              </a:rPr>
-              <a:t> </a:t>
-            </a:r>
-            <a:r>
-              <a:rPr lang="en-US" sz="2000" b="0" i="0" dirty="0">
-                <a:effectLst/>
-                <a:latin typeface="Söhne"/>
-              </a:rPr>
-              <a:t>Ensure a swift and fair judicial process by reducing case backlogs, increasing efficiency, and implementing restorative justice practices when appropriate.</a:t>
-            </a:r>
-            <a:endParaRPr lang="en-US" b="0" i="0" dirty="0">
-              <a:effectLst/>
-              <a:latin typeface="Söhne"/>
-            </a:endParaRPr>
+            <a:endParaRPr lang="en-US" dirty="0"/>
           </a:p>
         </p:txBody>
       </p:sp>
     </p:spTree>
     <p:extLst>
       <p:ext uri="{BB962C8B-B14F-4D97-AF65-F5344CB8AC3E}">
-        <p14:creationId xmlns:p14="http://schemas.microsoft.com/office/powerpoint/2010/main" val="1841207613"/>
+        <p14:creationId xmlns:p14="http://schemas.microsoft.com/office/powerpoint/2010/main" val="3052596072"/>
       </p:ext>
     </p:extLst>
   </p:cSld>
@@ -28652,6 +28434,420 @@
         </p:spPr>
         <p:txBody>
           <a:bodyPr>
+            <a:normAutofit lnSpcReduction="10000"/>
+          </a:bodyPr>
+          <a:lstStyle/>
+          <a:p>
+            <a:pPr marL="0" indent="0" algn="just">
+              <a:buNone/>
+            </a:pPr>
+            <a:endParaRPr lang="en-US" sz="2000" b="0" i="0" dirty="0">
+              <a:effectLst/>
+              <a:latin typeface="Söhne"/>
+            </a:endParaRPr>
+          </a:p>
+          <a:p>
+            <a:pPr marL="0" indent="0" algn="l">
+              <a:buNone/>
+            </a:pPr>
+            <a:r>
+              <a:rPr lang="en-US" b="1" i="0" dirty="0">
+                <a:effectLst/>
+                <a:latin typeface="Söhne"/>
+              </a:rPr>
+              <a:t>Community Policing and Engagement</a:t>
+            </a:r>
+            <a:r>
+              <a:rPr lang="en-US" b="0" i="0" dirty="0">
+                <a:effectLst/>
+                <a:latin typeface="Söhne"/>
+              </a:rPr>
+              <a:t>: </a:t>
+            </a:r>
+          </a:p>
+          <a:p>
+            <a:pPr marL="0" indent="0" algn="l">
+              <a:buNone/>
+            </a:pPr>
+            <a:r>
+              <a:rPr lang="en-US" sz="2000" b="0" i="0" dirty="0">
+                <a:effectLst/>
+                <a:latin typeface="Söhne"/>
+              </a:rPr>
+              <a:t>Establish strong community-police partnerships to foster trust and collaboration. Encourage police officers to interact positively with residents, understand local concerns, and work together to address issues.</a:t>
+            </a:r>
+            <a:endParaRPr lang="en-US" sz="1400" b="0" i="0" dirty="0">
+              <a:effectLst/>
+              <a:latin typeface="Söhne"/>
+            </a:endParaRPr>
+          </a:p>
+          <a:p>
+            <a:pPr marL="0" indent="0" algn="l">
+              <a:buNone/>
+            </a:pPr>
+            <a:r>
+              <a:rPr lang="en-US" b="1" i="0" dirty="0">
+                <a:effectLst/>
+                <a:latin typeface="Söhne"/>
+              </a:rPr>
+              <a:t>Enhanced Law Enforcement</a:t>
+            </a:r>
+            <a:r>
+              <a:rPr lang="en-US" b="0" i="0" dirty="0">
+                <a:effectLst/>
+                <a:latin typeface="Söhne"/>
+              </a:rPr>
+              <a:t>: I</a:t>
+            </a:r>
+          </a:p>
+          <a:p>
+            <a:pPr marL="0" indent="0" algn="l">
+              <a:buNone/>
+            </a:pPr>
+            <a:r>
+              <a:rPr lang="en-US" sz="2000" dirty="0">
+                <a:latin typeface="Söhne"/>
+              </a:rPr>
+              <a:t>Increase</a:t>
+            </a:r>
+            <a:r>
+              <a:rPr lang="en-US" sz="2000" b="0" i="0" dirty="0">
+                <a:effectLst/>
+                <a:latin typeface="Söhne"/>
+              </a:rPr>
+              <a:t> police presence in high-crime areas and implement effective patrolling strategies. Modernize the police force with technology, surveillance, and data-driven crime analysis to better allocate resources.</a:t>
+            </a:r>
+          </a:p>
+          <a:p>
+            <a:pPr marL="0" indent="0" algn="l">
+              <a:buNone/>
+            </a:pPr>
+            <a:r>
+              <a:rPr lang="en-US" b="1" i="0" dirty="0">
+                <a:effectLst/>
+                <a:latin typeface="Söhne"/>
+              </a:rPr>
+              <a:t>Youth Engagement and Education</a:t>
+            </a:r>
+            <a:r>
+              <a:rPr lang="en-US" b="0" i="0" dirty="0">
+                <a:effectLst/>
+                <a:latin typeface="Söhne"/>
+              </a:rPr>
+              <a:t>: </a:t>
+            </a:r>
+          </a:p>
+          <a:p>
+            <a:pPr marL="0" indent="0" algn="l">
+              <a:buNone/>
+            </a:pPr>
+            <a:r>
+              <a:rPr lang="en-US" sz="2000" b="0" i="0" dirty="0">
+                <a:effectLst/>
+                <a:latin typeface="Söhne"/>
+              </a:rPr>
+              <a:t>Develop programs that engage young people in positive activities and skill-building to divert them from criminal influences. Invest in quality education and vocational training opportunities to improve future prospects.</a:t>
+            </a:r>
+          </a:p>
+        </p:txBody>
+      </p:sp>
+    </p:spTree>
+    <p:extLst>
+      <p:ext uri="{BB962C8B-B14F-4D97-AF65-F5344CB8AC3E}">
+        <p14:creationId xmlns:p14="http://schemas.microsoft.com/office/powerpoint/2010/main" val="645485776"/>
+      </p:ext>
+    </p:extLst>
+  </p:cSld>
+  <p:clrMapOvr>
+    <a:masterClrMapping/>
+  </p:clrMapOvr>
+</p:sld>
+</file>
+
+<file path=ppt/slides/slide21.xml><?xml version="1.0" encoding="utf-8"?>
+<p:sld xmlns:a="http://schemas.openxmlformats.org/drawingml/2006/main" xmlns:r="http://schemas.openxmlformats.org/officeDocument/2006/relationships" xmlns:p="http://schemas.openxmlformats.org/presentationml/2006/main">
+  <p:cSld>
+    <p:spTree>
+      <p:nvGrpSpPr>
+        <p:cNvPr id="1" name=""/>
+        <p:cNvGrpSpPr/>
+        <p:nvPr/>
+      </p:nvGrpSpPr>
+      <p:grpSpPr>
+        <a:xfrm>
+          <a:off x="0" y="0"/>
+          <a:ext cx="0" cy="0"/>
+          <a:chOff x="0" y="0"/>
+          <a:chExt cx="0" cy="0"/>
+        </a:xfrm>
+      </p:grpSpPr>
+      <p:sp>
+        <p:nvSpPr>
+          <p:cNvPr id="2" name="Title 1">
+            <a:extLst>
+              <a:ext uri="{FF2B5EF4-FFF2-40B4-BE49-F238E27FC236}">
+                <a16:creationId xmlns:a16="http://schemas.microsoft.com/office/drawing/2014/main" id="{F8A587C5-A4E7-DA8A-F86A-F67A9AD6FD04}"/>
+              </a:ext>
+            </a:extLst>
+          </p:cNvPr>
+          <p:cNvSpPr>
+            <a:spLocks noGrp="1"/>
+          </p:cNvSpPr>
+          <p:nvPr>
+            <p:ph type="title"/>
+          </p:nvPr>
+        </p:nvSpPr>
+        <p:spPr>
+          <a:xfrm>
+            <a:off x="838200" y="365125"/>
+            <a:ext cx="7600950" cy="1325563"/>
+          </a:xfrm>
+        </p:spPr>
+        <p:txBody>
+          <a:bodyPr/>
+          <a:lstStyle/>
+          <a:p>
+            <a:r>
+              <a:rPr lang="en-US" dirty="0">
+                <a:latin typeface="Arial Rounded MT Bold" panose="020F0704030504030204" pitchFamily="34" charset="0"/>
+              </a:rPr>
+              <a:t>STRATEGIES AND RECOMMENDATIONS</a:t>
+            </a:r>
+          </a:p>
+        </p:txBody>
+      </p:sp>
+      <p:sp>
+        <p:nvSpPr>
+          <p:cNvPr id="3" name="Content Placeholder 2">
+            <a:extLst>
+              <a:ext uri="{FF2B5EF4-FFF2-40B4-BE49-F238E27FC236}">
+                <a16:creationId xmlns:a16="http://schemas.microsoft.com/office/drawing/2014/main" id="{02B7C7C2-9B70-9F11-2CE2-FEFEC895A18F}"/>
+              </a:ext>
+            </a:extLst>
+          </p:cNvPr>
+          <p:cNvSpPr>
+            <a:spLocks noGrp="1"/>
+          </p:cNvSpPr>
+          <p:nvPr>
+            <p:ph idx="1"/>
+          </p:nvPr>
+        </p:nvSpPr>
+        <p:spPr>
+          <a:xfrm>
+            <a:off x="838200" y="1854200"/>
+            <a:ext cx="10515600" cy="4351338"/>
+          </a:xfrm>
+        </p:spPr>
+        <p:txBody>
+          <a:bodyPr>
+            <a:normAutofit/>
+          </a:bodyPr>
+          <a:lstStyle/>
+          <a:p>
+            <a:pPr marL="0" indent="0" algn="just">
+              <a:buNone/>
+            </a:pPr>
+            <a:endParaRPr lang="en-US" sz="2000" b="0" i="0" dirty="0">
+              <a:effectLst/>
+              <a:latin typeface="Söhne"/>
+            </a:endParaRPr>
+          </a:p>
+          <a:p>
+            <a:pPr marL="0" indent="0" algn="l">
+              <a:buNone/>
+            </a:pPr>
+            <a:r>
+              <a:rPr lang="en-US" b="1" i="0" dirty="0">
+                <a:effectLst/>
+                <a:latin typeface="Söhne"/>
+              </a:rPr>
+              <a:t>Crime Prevention Through Environmental Design (CPTED)</a:t>
+            </a:r>
+            <a:endParaRPr lang="en-US" b="0" i="0" dirty="0">
+              <a:effectLst/>
+              <a:latin typeface="Söhne"/>
+            </a:endParaRPr>
+          </a:p>
+          <a:p>
+            <a:pPr marL="0" indent="0" algn="l">
+              <a:buNone/>
+            </a:pPr>
+            <a:r>
+              <a:rPr lang="en-US" b="0" i="0" dirty="0">
+                <a:effectLst/>
+                <a:latin typeface="Söhne"/>
+              </a:rPr>
+              <a:t> </a:t>
+            </a:r>
+            <a:r>
+              <a:rPr lang="en-US" sz="2000" b="0" i="0" dirty="0">
+                <a:effectLst/>
+                <a:latin typeface="Söhne"/>
+              </a:rPr>
+              <a:t>Design urban spaces with safety in mind, focusing on well-lit streets, clear signage, and well-maintained public areas that discourage criminal activities.</a:t>
+            </a:r>
+          </a:p>
+          <a:p>
+            <a:pPr marL="0" indent="0" algn="l">
+              <a:buNone/>
+            </a:pPr>
+            <a:r>
+              <a:rPr lang="en-US" b="1" i="0" dirty="0">
+                <a:effectLst/>
+                <a:latin typeface="Söhne"/>
+              </a:rPr>
+              <a:t>Social Services and Rehabilitation</a:t>
+            </a:r>
+            <a:r>
+              <a:rPr lang="en-US" b="0" i="0" dirty="0">
+                <a:effectLst/>
+                <a:latin typeface="Söhne"/>
+              </a:rPr>
+              <a:t> </a:t>
+            </a:r>
+          </a:p>
+          <a:p>
+            <a:pPr marL="0" indent="0" algn="l">
+              <a:buNone/>
+            </a:pPr>
+            <a:r>
+              <a:rPr lang="en-US" sz="2000" b="0" i="0" dirty="0">
+                <a:effectLst/>
+                <a:latin typeface="Söhne"/>
+              </a:rPr>
+              <a:t>Establish programs that support individuals at risk of criminal involvement, such as substance abuse counseling, mental health services, and reintegration programs for ex-offenders.</a:t>
+            </a:r>
+          </a:p>
+          <a:p>
+            <a:pPr marL="0" indent="0" algn="l">
+              <a:buNone/>
+            </a:pPr>
+            <a:r>
+              <a:rPr lang="en-US" b="1" i="0" dirty="0">
+                <a:effectLst/>
+                <a:latin typeface="Söhne"/>
+              </a:rPr>
+              <a:t>Strengthening Legal Institutions</a:t>
+            </a:r>
+            <a:endParaRPr lang="en-US" b="0" i="0" dirty="0">
+              <a:effectLst/>
+              <a:latin typeface="Söhne"/>
+            </a:endParaRPr>
+          </a:p>
+          <a:p>
+            <a:pPr marL="0" indent="0" algn="l">
+              <a:buNone/>
+            </a:pPr>
+            <a:r>
+              <a:rPr lang="en-US" b="0" i="0" dirty="0">
+                <a:effectLst/>
+                <a:latin typeface="Söhne"/>
+              </a:rPr>
+              <a:t> </a:t>
+            </a:r>
+            <a:r>
+              <a:rPr lang="en-US" sz="2000" b="0" i="0" dirty="0">
+                <a:effectLst/>
+                <a:latin typeface="Söhne"/>
+              </a:rPr>
+              <a:t>Ensure a swift and fair judicial process by reducing case backlogs, increasing efficiency, and implementing restorative justice practices when appropriate.</a:t>
+            </a:r>
+            <a:endParaRPr lang="en-US" b="0" i="0" dirty="0">
+              <a:effectLst/>
+              <a:latin typeface="Söhne"/>
+            </a:endParaRPr>
+          </a:p>
+        </p:txBody>
+      </p:sp>
+    </p:spTree>
+    <p:extLst>
+      <p:ext uri="{BB962C8B-B14F-4D97-AF65-F5344CB8AC3E}">
+        <p14:creationId xmlns:p14="http://schemas.microsoft.com/office/powerpoint/2010/main" val="1841207613"/>
+      </p:ext>
+    </p:extLst>
+  </p:cSld>
+  <p:clrMapOvr>
+    <a:masterClrMapping/>
+  </p:clrMapOvr>
+</p:sld>
+</file>
+
+<file path=ppt/slides/slide22.xml><?xml version="1.0" encoding="utf-8"?>
+<p:sld xmlns:a="http://schemas.openxmlformats.org/drawingml/2006/main" xmlns:r="http://schemas.openxmlformats.org/officeDocument/2006/relationships" xmlns:p="http://schemas.openxmlformats.org/presentationml/2006/main">
+  <p:cSld>
+    <p:spTree>
+      <p:nvGrpSpPr>
+        <p:cNvPr id="1" name=""/>
+        <p:cNvGrpSpPr/>
+        <p:nvPr/>
+      </p:nvGrpSpPr>
+      <p:grpSpPr>
+        <a:xfrm>
+          <a:off x="0" y="0"/>
+          <a:ext cx="0" cy="0"/>
+          <a:chOff x="0" y="0"/>
+          <a:chExt cx="0" cy="0"/>
+        </a:xfrm>
+      </p:grpSpPr>
+      <p:sp>
+        <p:nvSpPr>
+          <p:cNvPr id="2" name="Title 1">
+            <a:extLst>
+              <a:ext uri="{FF2B5EF4-FFF2-40B4-BE49-F238E27FC236}">
+                <a16:creationId xmlns:a16="http://schemas.microsoft.com/office/drawing/2014/main" id="{F8A587C5-A4E7-DA8A-F86A-F67A9AD6FD04}"/>
+              </a:ext>
+            </a:extLst>
+          </p:cNvPr>
+          <p:cNvSpPr>
+            <a:spLocks noGrp="1"/>
+          </p:cNvSpPr>
+          <p:nvPr>
+            <p:ph type="title"/>
+          </p:nvPr>
+        </p:nvSpPr>
+        <p:spPr>
+          <a:xfrm>
+            <a:off x="838200" y="365125"/>
+            <a:ext cx="7600950" cy="1325563"/>
+          </a:xfrm>
+        </p:spPr>
+        <p:txBody>
+          <a:bodyPr/>
+          <a:lstStyle/>
+          <a:p>
+            <a:r>
+              <a:rPr lang="en-US" dirty="0">
+                <a:latin typeface="Arial Rounded MT Bold" panose="020F0704030504030204" pitchFamily="34" charset="0"/>
+              </a:rPr>
+              <a:t>STRATEGIES AND RECOMMENDATIONS</a:t>
+            </a:r>
+          </a:p>
+        </p:txBody>
+      </p:sp>
+      <p:sp>
+        <p:nvSpPr>
+          <p:cNvPr id="3" name="Content Placeholder 2">
+            <a:extLst>
+              <a:ext uri="{FF2B5EF4-FFF2-40B4-BE49-F238E27FC236}">
+                <a16:creationId xmlns:a16="http://schemas.microsoft.com/office/drawing/2014/main" id="{02B7C7C2-9B70-9F11-2CE2-FEFEC895A18F}"/>
+              </a:ext>
+            </a:extLst>
+          </p:cNvPr>
+          <p:cNvSpPr>
+            <a:spLocks noGrp="1"/>
+          </p:cNvSpPr>
+          <p:nvPr>
+            <p:ph idx="1"/>
+          </p:nvPr>
+        </p:nvSpPr>
+        <p:spPr>
+          <a:xfrm>
+            <a:off x="838200" y="1854200"/>
+            <a:ext cx="10515600" cy="4351338"/>
+          </a:xfrm>
+        </p:spPr>
+        <p:txBody>
+          <a:bodyPr>
             <a:normAutofit/>
           </a:bodyPr>
           <a:lstStyle/>
@@ -28780,7 +28976,7 @@
 </p:sld>
 </file>
 
-<file path=ppt/slides/slide21.xml><?xml version="1.0" encoding="utf-8"?>
+<file path=ppt/slides/slide23.xml><?xml version="1.0" encoding="utf-8"?>
 <p:sld xmlns:a="http://schemas.openxmlformats.org/drawingml/2006/main" xmlns:r="http://schemas.openxmlformats.org/officeDocument/2006/relationships" xmlns:p="http://schemas.openxmlformats.org/presentationml/2006/main">
   <p:cSld>
     <p:spTree>
@@ -29011,7 +29207,7 @@
 </p:sld>
 </file>
 
-<file path=ppt/slides/slide22.xml><?xml version="1.0" encoding="utf-8"?>
+<file path=ppt/slides/slide24.xml><?xml version="1.0" encoding="utf-8"?>
 <p:sld xmlns:a="http://schemas.openxmlformats.org/drawingml/2006/main" xmlns:r="http://schemas.openxmlformats.org/officeDocument/2006/relationships" xmlns:p="http://schemas.openxmlformats.org/presentationml/2006/main">
   <p:cSld>
     <p:spTree>

</xml_diff>

<commit_message>
changed causes of crime
</commit_message>
<xml_diff>
--- a/BGS/FINAL PRESENTATION/CRIME IN DHAKA CITY.pptx
+++ b/BGS/FINAL PRESENTATION/CRIME IN DHAKA CITY.pptx
@@ -26990,34 +26990,33 @@
             </a:pPr>
             <a:r>
               <a:rPr lang="en-US" b="1" i="0" dirty="0">
-                <a:solidFill>
-                  <a:srgbClr val="232323"/>
-                </a:solidFill>
                 <a:effectLst/>
-                <a:latin typeface="Verdana" panose="020B0604030504040204" pitchFamily="34" charset="0"/>
+                <a:latin typeface="Söhne"/>
               </a:rPr>
-              <a:t>Abuse of political power</a:t>
-            </a:r>
-          </a:p>
-          <a:p>
-            <a:pPr marL="0" indent="0" algn="just">
-              <a:buNone/>
-            </a:pPr>
-            <a:r>
-              <a:rPr lang="en-US" sz="2000" b="0" i="0" dirty="0">
-                <a:solidFill>
-                  <a:srgbClr val="232323"/>
-                </a:solidFill>
-                <a:effectLst/>
-                <a:latin typeface="Verdana" panose="020B0604030504040204" pitchFamily="34" charset="0"/>
-              </a:rPr>
-              <a:t>Recently a common thing is the abuse of political power. Some people are very strongly involved with this. The government is sending relief for homeless and poor people, but they are not getting this relief. As soon as government relief arrives, they are sharing among themselves. Crime is being created today for all these influential people. Influential people are creating terror. Influential people are taking advantage of the weakness of the poor and uneducated people</a:t>
+              <a:t>Political Instability</a:t>
             </a:r>
           </a:p>
           <a:p>
             <a:pPr marL="0" indent="0" algn="l">
               <a:buNone/>
             </a:pPr>
+            <a:r>
+              <a:rPr lang="en-US" b="0" i="0" dirty="0">
+                <a:effectLst/>
+                <a:latin typeface="Söhne"/>
+              </a:rPr>
+              <a:t>Political unrest or instability can create an environment conducive to criminal activities, as law enforcement resources might be diverted</a:t>
+            </a:r>
+            <a:r>
+              <a:rPr lang="en-US" b="0" i="0" dirty="0">
+                <a:solidFill>
+                  <a:srgbClr val="D1D5DB"/>
+                </a:solidFill>
+                <a:effectLst/>
+                <a:latin typeface="Söhne"/>
+              </a:rPr>
+              <a:t>.</a:t>
+            </a:r>
             <a:endParaRPr lang="en-US" sz="2000" b="0" i="0" dirty="0">
               <a:solidFill>
                 <a:srgbClr val="232323"/>
@@ -27105,7 +27104,7 @@
         <p:spPr>
           <a:xfrm>
             <a:off x="838200" y="4048125"/>
-            <a:ext cx="10515600" cy="2954655"/>
+            <a:ext cx="10515600" cy="1261884"/>
           </a:xfrm>
           <a:prstGeom prst="rect">
             <a:avLst/>
@@ -27118,33 +27117,27 @@
           </a:bodyPr>
           <a:lstStyle/>
           <a:p>
-            <a:pPr algn="l"/>
             <a:r>
               <a:rPr lang="en-US" sz="2800" b="1" i="0" dirty="0">
-                <a:solidFill>
-                  <a:srgbClr val="232323"/>
-                </a:solidFill>
                 <a:effectLst/>
-                <a:latin typeface="Verdana" panose="020B0604030504040204" pitchFamily="34" charset="0"/>
+                <a:latin typeface="Söhne"/>
               </a:rPr>
-              <a:t>State of the family</a:t>
+              <a:t>Weak Judicial System</a:t>
             </a:r>
+            <a:endParaRPr lang="en-US" sz="2800" b="0" i="0" dirty="0">
+              <a:effectLst/>
+              <a:latin typeface="Söhne"/>
+            </a:endParaRPr>
           </a:p>
           <a:p>
-            <a:pPr algn="just"/>
             <a:r>
-              <a:rPr lang="en-US" sz="2000" b="0" i="0" dirty="0">
-                <a:solidFill>
-                  <a:srgbClr val="232323"/>
-                </a:solidFill>
+              <a:rPr lang="en-US" sz="2400" b="0" i="0" dirty="0">
                 <a:effectLst/>
-                <a:latin typeface="Verdana" panose="020B0604030504040204" pitchFamily="34" charset="0"/>
+                <a:latin typeface="Söhne"/>
               </a:rPr>
-              <a:t>Most crimes start from the family and later spread to the society. The initiation of all types of crime is family unrest and property. Since most families in the village are poor and illiterate, that’s why there is no opportunity to consider what is right and what is wrong. An uneducated family cannot teach a proper lesson to their family child. In that cause, girls are getting married at an early age, children are involved in crime and children are taking drugs, being terrorists, carrying weapons, and beginning an illegal business</a:t>
+              <a:t>Delays in the judicial process and lack of trust in the legal system can discourage victims from reporting crimes and perpetrators from fearing consequences</a:t>
             </a:r>
-          </a:p>
-          <a:p>
-            <a:endParaRPr lang="en-US" dirty="0"/>
+            <a:endParaRPr lang="en-US" sz="2400" dirty="0"/>
           </a:p>
         </p:txBody>
       </p:sp>
@@ -30899,13 +30892,13 @@
           <p:nvPr>
             <p:extLst>
               <p:ext uri="{D42A27DB-BD31-4B8C-83A1-F6EECF244321}">
-                <p14:modId xmlns:p14="http://schemas.microsoft.com/office/powerpoint/2010/main" val="1818182323"/>
+                <p14:modId xmlns:p14="http://schemas.microsoft.com/office/powerpoint/2010/main" val="3080174097"/>
               </p:ext>
             </p:extLst>
           </p:nvPr>
         </p:nvGraphicFramePr>
         <p:xfrm>
-          <a:off x="1066801" y="1576388"/>
+          <a:off x="2162176" y="1433513"/>
           <a:ext cx="8943974" cy="5030787"/>
         </p:xfrm>
         <a:graphic>

</xml_diff>